<commit_message>
extra lesmaterialen zijn toegevoegd.
</commit_message>
<xml_diff>
--- a/Notebooks/Nederlands/02 - Objecten datastructuren en operatoren/01 - Variabelen Toewijzing.pptx
+++ b/Notebooks/Nederlands/02 - Objecten datastructuren en operatoren/01 - Variabelen Toewijzing.pptx
@@ -13,9 +13,8 @@
     <p:sldId id="261" r:id="rId7"/>
     <p:sldId id="262" r:id="rId8"/>
     <p:sldId id="263" r:id="rId9"/>
-    <p:sldId id="264" r:id="rId10"/>
   </p:sldIdLst>
-  <p:sldSz cx="9144000" cy="5143500" type="screen16x9"/>
+  <p:sldSz cx="9144000" cy="6858000" type="screen4x3"/>
   <p:notesSz cx="6858000" cy="9144000"/>
   <p:defaultTextStyle>
     <a:defPPr>
@@ -115,12 +114,12 @@
   <p:extLst>
     <p:ext uri="{EFAFB233-063F-42B5-8137-9DF3F51BA10A}">
       <p15:sldGuideLst xmlns:p15="http://schemas.microsoft.com/office/powerpoint/2012/main">
-        <p15:guide id="1" orient="horz" pos="1620" userDrawn="1">
+        <p15:guide id="1" orient="horz" pos="2160">
           <p15:clr>
             <a:srgbClr val="A4A3A4"/>
           </p15:clr>
         </p15:guide>
-        <p15:guide id="2" pos="2880" userDrawn="1">
+        <p15:guide id="2" pos="2880">
           <p15:clr>
             <a:srgbClr val="A4A3A4"/>
           </p15:clr>
@@ -160,8 +159,8 @@
         </p:nvSpPr>
         <p:spPr>
           <a:xfrm>
-            <a:off x="685800" y="1597819"/>
-            <a:ext cx="7772400" cy="1102519"/>
+            <a:off x="685800" y="2130425"/>
+            <a:ext cx="7772400" cy="1470025"/>
           </a:xfrm>
         </p:spPr>
         <p:txBody>
@@ -169,9 +168,10 @@
           <a:lstStyle/>
           <a:p>
             <a:r>
-              <a:rPr lang="en-US"/>
+              <a:rPr lang="en-US" smtClean="0"/>
               <a:t>Click to edit Master title style</a:t>
             </a:r>
+            <a:endParaRPr lang="en-US"/>
           </a:p>
         </p:txBody>
       </p:sp>
@@ -187,8 +187,8 @@
         </p:nvSpPr>
         <p:spPr>
           <a:xfrm>
-            <a:off x="1371600" y="2914650"/>
-            <a:ext cx="6400800" cy="1314450"/>
+            <a:off x="1371600" y="3886200"/>
+            <a:ext cx="6400800" cy="1752600"/>
           </a:xfrm>
         </p:spPr>
         <p:txBody>
@@ -204,7 +204,7 @@
                 </a:solidFill>
               </a:defRPr>
             </a:lvl1pPr>
-            <a:lvl2pPr marL="342900" indent="0" algn="ctr">
+            <a:lvl2pPr marL="457200" indent="0" algn="ctr">
               <a:buNone/>
               <a:defRPr>
                 <a:solidFill>
@@ -214,7 +214,7 @@
                 </a:solidFill>
               </a:defRPr>
             </a:lvl2pPr>
-            <a:lvl3pPr marL="685800" indent="0" algn="ctr">
+            <a:lvl3pPr marL="914400" indent="0" algn="ctr">
               <a:buNone/>
               <a:defRPr>
                 <a:solidFill>
@@ -224,7 +224,7 @@
                 </a:solidFill>
               </a:defRPr>
             </a:lvl3pPr>
-            <a:lvl4pPr marL="1028700" indent="0" algn="ctr">
+            <a:lvl4pPr marL="1371600" indent="0" algn="ctr">
               <a:buNone/>
               <a:defRPr>
                 <a:solidFill>
@@ -234,7 +234,7 @@
                 </a:solidFill>
               </a:defRPr>
             </a:lvl4pPr>
-            <a:lvl5pPr marL="1371600" indent="0" algn="ctr">
+            <a:lvl5pPr marL="1828800" indent="0" algn="ctr">
               <a:buNone/>
               <a:defRPr>
                 <a:solidFill>
@@ -244,7 +244,7 @@
                 </a:solidFill>
               </a:defRPr>
             </a:lvl5pPr>
-            <a:lvl6pPr marL="1714500" indent="0" algn="ctr">
+            <a:lvl6pPr marL="2286000" indent="0" algn="ctr">
               <a:buNone/>
               <a:defRPr>
                 <a:solidFill>
@@ -254,7 +254,7 @@
                 </a:solidFill>
               </a:defRPr>
             </a:lvl6pPr>
-            <a:lvl7pPr marL="2057400" indent="0" algn="ctr">
+            <a:lvl7pPr marL="2743200" indent="0" algn="ctr">
               <a:buNone/>
               <a:defRPr>
                 <a:solidFill>
@@ -264,7 +264,7 @@
                 </a:solidFill>
               </a:defRPr>
             </a:lvl7pPr>
-            <a:lvl8pPr marL="2400300" indent="0" algn="ctr">
+            <a:lvl8pPr marL="3200400" indent="0" algn="ctr">
               <a:buNone/>
               <a:defRPr>
                 <a:solidFill>
@@ -274,7 +274,7 @@
                 </a:solidFill>
               </a:defRPr>
             </a:lvl8pPr>
-            <a:lvl9pPr marL="2743200" indent="0" algn="ctr">
+            <a:lvl9pPr marL="3657600" indent="0" algn="ctr">
               <a:buNone/>
               <a:defRPr>
                 <a:solidFill>
@@ -287,9 +287,10 @@
           </a:lstStyle>
           <a:p>
             <a:r>
-              <a:rPr lang="en-US"/>
+              <a:rPr lang="en-US" smtClean="0"/>
               <a:t>Click to edit Master subtitle style</a:t>
             </a:r>
+            <a:endParaRPr lang="en-US"/>
           </a:p>
         </p:txBody>
       </p:sp>
@@ -310,7 +311,7 @@
           <a:p>
             <a:fld id="{241EB5C9-1307-BA42-ABA2-0BC069CD8E7F}" type="datetimeFigureOut">
               <a:rPr lang="en-US" smtClean="0"/>
-              <a:t>1/2/22</a:t>
+              <a:t>4/5/2019</a:t>
             </a:fld>
             <a:endParaRPr lang="en-US"/>
           </a:p>
@@ -404,9 +405,10 @@
           <a:lstStyle/>
           <a:p>
             <a:r>
-              <a:rPr lang="en-US"/>
+              <a:rPr lang="en-US" smtClean="0"/>
               <a:t>Click to edit Master title style</a:t>
             </a:r>
+            <a:endParaRPr lang="en-US"/>
           </a:p>
         </p:txBody>
       </p:sp>
@@ -427,37 +429,38 @@
           <a:p>
             <a:pPr lvl="0"/>
             <a:r>
-              <a:rPr lang="en-US"/>
+              <a:rPr lang="en-US" smtClean="0"/>
               <a:t>Click to edit Master text styles</a:t>
             </a:r>
           </a:p>
           <a:p>
             <a:pPr lvl="1"/>
             <a:r>
-              <a:rPr lang="en-US"/>
+              <a:rPr lang="en-US" smtClean="0"/>
               <a:t>Second level</a:t>
             </a:r>
           </a:p>
           <a:p>
             <a:pPr lvl="2"/>
             <a:r>
-              <a:rPr lang="en-US"/>
+              <a:rPr lang="en-US" smtClean="0"/>
               <a:t>Third level</a:t>
             </a:r>
           </a:p>
           <a:p>
             <a:pPr lvl="3"/>
             <a:r>
-              <a:rPr lang="en-US"/>
+              <a:rPr lang="en-US" smtClean="0"/>
               <a:t>Fourth level</a:t>
             </a:r>
           </a:p>
           <a:p>
             <a:pPr lvl="4"/>
             <a:r>
-              <a:rPr lang="en-US"/>
+              <a:rPr lang="en-US" smtClean="0"/>
               <a:t>Fifth level</a:t>
             </a:r>
+            <a:endParaRPr lang="en-US"/>
           </a:p>
         </p:txBody>
       </p:sp>
@@ -478,7 +481,7 @@
           <a:p>
             <a:fld id="{241EB5C9-1307-BA42-ABA2-0BC069CD8E7F}" type="datetimeFigureOut">
               <a:rPr lang="en-US" smtClean="0"/>
-              <a:t>1/2/22</a:t>
+              <a:t>4/5/2019</a:t>
             </a:fld>
             <a:endParaRPr lang="en-US"/>
           </a:p>
@@ -568,8 +571,8 @@
         </p:nvSpPr>
         <p:spPr>
           <a:xfrm>
-            <a:off x="6629400" y="205979"/>
-            <a:ext cx="2057400" cy="4388644"/>
+            <a:off x="6629400" y="274638"/>
+            <a:ext cx="2057400" cy="5851525"/>
           </a:xfrm>
         </p:spPr>
         <p:txBody>
@@ -577,9 +580,10 @@
           <a:lstStyle/>
           <a:p>
             <a:r>
-              <a:rPr lang="en-US"/>
+              <a:rPr lang="en-US" smtClean="0"/>
               <a:t>Click to edit Master title style</a:t>
             </a:r>
+            <a:endParaRPr lang="en-US"/>
           </a:p>
         </p:txBody>
       </p:sp>
@@ -595,8 +599,8 @@
         </p:nvSpPr>
         <p:spPr>
           <a:xfrm>
-            <a:off x="457200" y="205979"/>
-            <a:ext cx="6019800" cy="4388644"/>
+            <a:off x="457200" y="274638"/>
+            <a:ext cx="6019800" cy="5851525"/>
           </a:xfrm>
         </p:spPr>
         <p:txBody>
@@ -605,37 +609,38 @@
           <a:p>
             <a:pPr lvl="0"/>
             <a:r>
-              <a:rPr lang="en-US"/>
+              <a:rPr lang="en-US" smtClean="0"/>
               <a:t>Click to edit Master text styles</a:t>
             </a:r>
           </a:p>
           <a:p>
             <a:pPr lvl="1"/>
             <a:r>
-              <a:rPr lang="en-US"/>
+              <a:rPr lang="en-US" smtClean="0"/>
               <a:t>Second level</a:t>
             </a:r>
           </a:p>
           <a:p>
             <a:pPr lvl="2"/>
             <a:r>
-              <a:rPr lang="en-US"/>
+              <a:rPr lang="en-US" smtClean="0"/>
               <a:t>Third level</a:t>
             </a:r>
           </a:p>
           <a:p>
             <a:pPr lvl="3"/>
             <a:r>
-              <a:rPr lang="en-US"/>
+              <a:rPr lang="en-US" smtClean="0"/>
               <a:t>Fourth level</a:t>
             </a:r>
           </a:p>
           <a:p>
             <a:pPr lvl="4"/>
             <a:r>
-              <a:rPr lang="en-US"/>
+              <a:rPr lang="en-US" smtClean="0"/>
               <a:t>Fifth level</a:t>
             </a:r>
+            <a:endParaRPr lang="en-US"/>
           </a:p>
         </p:txBody>
       </p:sp>
@@ -656,7 +661,7 @@
           <a:p>
             <a:fld id="{241EB5C9-1307-BA42-ABA2-0BC069CD8E7F}" type="datetimeFigureOut">
               <a:rPr lang="en-US" smtClean="0"/>
-              <a:t>1/2/22</a:t>
+              <a:t>4/5/2019</a:t>
             </a:fld>
             <a:endParaRPr lang="en-US"/>
           </a:p>
@@ -750,9 +755,10 @@
           <a:lstStyle/>
           <a:p>
             <a:r>
-              <a:rPr lang="en-US"/>
+              <a:rPr lang="en-US" smtClean="0"/>
               <a:t>Click to edit Master title style</a:t>
             </a:r>
+            <a:endParaRPr lang="en-US"/>
           </a:p>
         </p:txBody>
       </p:sp>
@@ -773,37 +779,38 @@
           <a:p>
             <a:pPr lvl="0"/>
             <a:r>
-              <a:rPr lang="en-US"/>
+              <a:rPr lang="en-US" smtClean="0"/>
               <a:t>Click to edit Master text styles</a:t>
             </a:r>
           </a:p>
           <a:p>
             <a:pPr lvl="1"/>
             <a:r>
-              <a:rPr lang="en-US"/>
+              <a:rPr lang="en-US" smtClean="0"/>
               <a:t>Second level</a:t>
             </a:r>
           </a:p>
           <a:p>
             <a:pPr lvl="2"/>
             <a:r>
-              <a:rPr lang="en-US"/>
+              <a:rPr lang="en-US" smtClean="0"/>
               <a:t>Third level</a:t>
             </a:r>
           </a:p>
           <a:p>
             <a:pPr lvl="3"/>
             <a:r>
-              <a:rPr lang="en-US"/>
+              <a:rPr lang="en-US" smtClean="0"/>
               <a:t>Fourth level</a:t>
             </a:r>
           </a:p>
           <a:p>
             <a:pPr lvl="4"/>
             <a:r>
-              <a:rPr lang="en-US"/>
+              <a:rPr lang="en-US" smtClean="0"/>
               <a:t>Fifth level</a:t>
             </a:r>
+            <a:endParaRPr lang="en-US"/>
           </a:p>
         </p:txBody>
       </p:sp>
@@ -824,7 +831,7 @@
           <a:p>
             <a:fld id="{241EB5C9-1307-BA42-ABA2-0BC069CD8E7F}" type="datetimeFigureOut">
               <a:rPr lang="en-US" smtClean="0"/>
-              <a:t>1/2/22</a:t>
+              <a:t>4/5/2019</a:t>
             </a:fld>
             <a:endParaRPr lang="en-US"/>
           </a:p>
@@ -914,22 +921,23 @@
         </p:nvSpPr>
         <p:spPr>
           <a:xfrm>
-            <a:off x="722313" y="3305176"/>
-            <a:ext cx="7772400" cy="1021556"/>
+            <a:off x="722313" y="4406900"/>
+            <a:ext cx="7772400" cy="1362075"/>
           </a:xfrm>
         </p:spPr>
         <p:txBody>
           <a:bodyPr anchor="t"/>
           <a:lstStyle>
             <a:lvl1pPr algn="l">
-              <a:defRPr sz="3000" b="1" cap="all"/>
+              <a:defRPr sz="4000" b="1" cap="all"/>
             </a:lvl1pPr>
           </a:lstStyle>
           <a:p>
             <a:r>
-              <a:rPr lang="en-US"/>
+              <a:rPr lang="en-US" smtClean="0"/>
               <a:t>Click to edit Master title style</a:t>
             </a:r>
+            <a:endParaRPr lang="en-US"/>
           </a:p>
         </p:txBody>
       </p:sp>
@@ -945,8 +953,8 @@
         </p:nvSpPr>
         <p:spPr>
           <a:xfrm>
-            <a:off x="722313" y="2180035"/>
-            <a:ext cx="7772400" cy="1125140"/>
+            <a:off x="722313" y="2906713"/>
+            <a:ext cx="7772400" cy="1500187"/>
           </a:xfrm>
         </p:spPr>
         <p:txBody>
@@ -954,7 +962,7 @@
           <a:lstStyle>
             <a:lvl1pPr marL="0" indent="0">
               <a:buNone/>
-              <a:defRPr sz="1500">
+              <a:defRPr sz="2000">
                 <a:solidFill>
                   <a:schemeClr val="tx1">
                     <a:tint val="75000"/>
@@ -962,9 +970,9 @@
                 </a:solidFill>
               </a:defRPr>
             </a:lvl1pPr>
-            <a:lvl2pPr marL="342900" indent="0">
-              <a:buNone/>
-              <a:defRPr sz="1350">
+            <a:lvl2pPr marL="457200" indent="0">
+              <a:buNone/>
+              <a:defRPr sz="1800">
                 <a:solidFill>
                   <a:schemeClr val="tx1">
                     <a:tint val="75000"/>
@@ -972,9 +980,9 @@
                 </a:solidFill>
               </a:defRPr>
             </a:lvl2pPr>
-            <a:lvl3pPr marL="685800" indent="0">
-              <a:buNone/>
-              <a:defRPr sz="1200">
+            <a:lvl3pPr marL="914400" indent="0">
+              <a:buNone/>
+              <a:defRPr sz="1600">
                 <a:solidFill>
                   <a:schemeClr val="tx1">
                     <a:tint val="75000"/>
@@ -982,9 +990,9 @@
                 </a:solidFill>
               </a:defRPr>
             </a:lvl3pPr>
-            <a:lvl4pPr marL="1028700" indent="0">
-              <a:buNone/>
-              <a:defRPr sz="1050">
+            <a:lvl4pPr marL="1371600" indent="0">
+              <a:buNone/>
+              <a:defRPr sz="1400">
                 <a:solidFill>
                   <a:schemeClr val="tx1">
                     <a:tint val="75000"/>
@@ -992,9 +1000,9 @@
                 </a:solidFill>
               </a:defRPr>
             </a:lvl4pPr>
-            <a:lvl5pPr marL="1371600" indent="0">
-              <a:buNone/>
-              <a:defRPr sz="1050">
+            <a:lvl5pPr marL="1828800" indent="0">
+              <a:buNone/>
+              <a:defRPr sz="1400">
                 <a:solidFill>
                   <a:schemeClr val="tx1">
                     <a:tint val="75000"/>
@@ -1002,9 +1010,9 @@
                 </a:solidFill>
               </a:defRPr>
             </a:lvl5pPr>
-            <a:lvl6pPr marL="1714500" indent="0">
-              <a:buNone/>
-              <a:defRPr sz="1050">
+            <a:lvl6pPr marL="2286000" indent="0">
+              <a:buNone/>
+              <a:defRPr sz="1400">
                 <a:solidFill>
                   <a:schemeClr val="tx1">
                     <a:tint val="75000"/>
@@ -1012,9 +1020,9 @@
                 </a:solidFill>
               </a:defRPr>
             </a:lvl6pPr>
-            <a:lvl7pPr marL="2057400" indent="0">
-              <a:buNone/>
-              <a:defRPr sz="1050">
+            <a:lvl7pPr marL="2743200" indent="0">
+              <a:buNone/>
+              <a:defRPr sz="1400">
                 <a:solidFill>
                   <a:schemeClr val="tx1">
                     <a:tint val="75000"/>
@@ -1022,9 +1030,9 @@
                 </a:solidFill>
               </a:defRPr>
             </a:lvl7pPr>
-            <a:lvl8pPr marL="2400300" indent="0">
-              <a:buNone/>
-              <a:defRPr sz="1050">
+            <a:lvl8pPr marL="3200400" indent="0">
+              <a:buNone/>
+              <a:defRPr sz="1400">
                 <a:solidFill>
                   <a:schemeClr val="tx1">
                     <a:tint val="75000"/>
@@ -1032,9 +1040,9 @@
                 </a:solidFill>
               </a:defRPr>
             </a:lvl8pPr>
-            <a:lvl9pPr marL="2743200" indent="0">
-              <a:buNone/>
-              <a:defRPr sz="1050">
+            <a:lvl9pPr marL="3657600" indent="0">
+              <a:buNone/>
+              <a:defRPr sz="1400">
                 <a:solidFill>
                   <a:schemeClr val="tx1">
                     <a:tint val="75000"/>
@@ -1046,7 +1054,7 @@
           <a:p>
             <a:pPr lvl="0"/>
             <a:r>
-              <a:rPr lang="en-US"/>
+              <a:rPr lang="en-US" smtClean="0"/>
               <a:t>Click to edit Master text styles</a:t>
             </a:r>
           </a:p>
@@ -1069,7 +1077,7 @@
           <a:p>
             <a:fld id="{241EB5C9-1307-BA42-ABA2-0BC069CD8E7F}" type="datetimeFigureOut">
               <a:rPr lang="en-US" smtClean="0"/>
-              <a:t>1/2/22</a:t>
+              <a:t>4/5/2019</a:t>
             </a:fld>
             <a:endParaRPr lang="en-US"/>
           </a:p>
@@ -1163,9 +1171,10 @@
           <a:lstStyle/>
           <a:p>
             <a:r>
-              <a:rPr lang="en-US"/>
+              <a:rPr lang="en-US" smtClean="0"/>
               <a:t>Click to edit Master title style</a:t>
             </a:r>
+            <a:endParaRPr lang="en-US"/>
           </a:p>
         </p:txBody>
       </p:sp>
@@ -1181,75 +1190,76 @@
         </p:nvSpPr>
         <p:spPr>
           <a:xfrm>
-            <a:off x="457200" y="1200151"/>
-            <a:ext cx="4038600" cy="3394472"/>
+            <a:off x="457200" y="1600200"/>
+            <a:ext cx="4038600" cy="4525963"/>
           </a:xfrm>
         </p:spPr>
         <p:txBody>
           <a:bodyPr/>
           <a:lstStyle>
             <a:lvl1pPr>
-              <a:defRPr sz="2100"/>
+              <a:defRPr sz="2800"/>
             </a:lvl1pPr>
             <a:lvl2pPr>
-              <a:defRPr sz="1800"/>
+              <a:defRPr sz="2400"/>
             </a:lvl2pPr>
             <a:lvl3pPr>
-              <a:defRPr sz="1500"/>
+              <a:defRPr sz="2000"/>
             </a:lvl3pPr>
             <a:lvl4pPr>
-              <a:defRPr sz="1350"/>
+              <a:defRPr sz="1800"/>
             </a:lvl4pPr>
             <a:lvl5pPr>
-              <a:defRPr sz="1350"/>
+              <a:defRPr sz="1800"/>
             </a:lvl5pPr>
             <a:lvl6pPr>
-              <a:defRPr sz="1350"/>
+              <a:defRPr sz="1800"/>
             </a:lvl6pPr>
             <a:lvl7pPr>
-              <a:defRPr sz="1350"/>
+              <a:defRPr sz="1800"/>
             </a:lvl7pPr>
             <a:lvl8pPr>
-              <a:defRPr sz="1350"/>
+              <a:defRPr sz="1800"/>
             </a:lvl8pPr>
             <a:lvl9pPr>
-              <a:defRPr sz="1350"/>
+              <a:defRPr sz="1800"/>
             </a:lvl9pPr>
           </a:lstStyle>
           <a:p>
             <a:pPr lvl="0"/>
             <a:r>
-              <a:rPr lang="en-US"/>
+              <a:rPr lang="en-US" smtClean="0"/>
               <a:t>Click to edit Master text styles</a:t>
             </a:r>
           </a:p>
           <a:p>
             <a:pPr lvl="1"/>
             <a:r>
-              <a:rPr lang="en-US"/>
+              <a:rPr lang="en-US" smtClean="0"/>
               <a:t>Second level</a:t>
             </a:r>
           </a:p>
           <a:p>
             <a:pPr lvl="2"/>
             <a:r>
-              <a:rPr lang="en-US"/>
+              <a:rPr lang="en-US" smtClean="0"/>
               <a:t>Third level</a:t>
             </a:r>
           </a:p>
           <a:p>
             <a:pPr lvl="3"/>
             <a:r>
-              <a:rPr lang="en-US"/>
+              <a:rPr lang="en-US" smtClean="0"/>
               <a:t>Fourth level</a:t>
             </a:r>
           </a:p>
           <a:p>
             <a:pPr lvl="4"/>
             <a:r>
-              <a:rPr lang="en-US"/>
+              <a:rPr lang="en-US" smtClean="0"/>
               <a:t>Fifth level</a:t>
             </a:r>
+            <a:endParaRPr lang="en-US"/>
           </a:p>
         </p:txBody>
       </p:sp>
@@ -1265,75 +1275,76 @@
         </p:nvSpPr>
         <p:spPr>
           <a:xfrm>
-            <a:off x="4648200" y="1200151"/>
-            <a:ext cx="4038600" cy="3394472"/>
+            <a:off x="4648200" y="1600200"/>
+            <a:ext cx="4038600" cy="4525963"/>
           </a:xfrm>
         </p:spPr>
         <p:txBody>
           <a:bodyPr/>
           <a:lstStyle>
             <a:lvl1pPr>
-              <a:defRPr sz="2100"/>
+              <a:defRPr sz="2800"/>
             </a:lvl1pPr>
             <a:lvl2pPr>
-              <a:defRPr sz="1800"/>
+              <a:defRPr sz="2400"/>
             </a:lvl2pPr>
             <a:lvl3pPr>
-              <a:defRPr sz="1500"/>
+              <a:defRPr sz="2000"/>
             </a:lvl3pPr>
             <a:lvl4pPr>
-              <a:defRPr sz="1350"/>
+              <a:defRPr sz="1800"/>
             </a:lvl4pPr>
             <a:lvl5pPr>
-              <a:defRPr sz="1350"/>
+              <a:defRPr sz="1800"/>
             </a:lvl5pPr>
             <a:lvl6pPr>
-              <a:defRPr sz="1350"/>
+              <a:defRPr sz="1800"/>
             </a:lvl6pPr>
             <a:lvl7pPr>
-              <a:defRPr sz="1350"/>
+              <a:defRPr sz="1800"/>
             </a:lvl7pPr>
             <a:lvl8pPr>
-              <a:defRPr sz="1350"/>
+              <a:defRPr sz="1800"/>
             </a:lvl8pPr>
             <a:lvl9pPr>
-              <a:defRPr sz="1350"/>
+              <a:defRPr sz="1800"/>
             </a:lvl9pPr>
           </a:lstStyle>
           <a:p>
             <a:pPr lvl="0"/>
             <a:r>
-              <a:rPr lang="en-US"/>
+              <a:rPr lang="en-US" smtClean="0"/>
               <a:t>Click to edit Master text styles</a:t>
             </a:r>
           </a:p>
           <a:p>
             <a:pPr lvl="1"/>
             <a:r>
-              <a:rPr lang="en-US"/>
+              <a:rPr lang="en-US" smtClean="0"/>
               <a:t>Second level</a:t>
             </a:r>
           </a:p>
           <a:p>
             <a:pPr lvl="2"/>
             <a:r>
-              <a:rPr lang="en-US"/>
+              <a:rPr lang="en-US" smtClean="0"/>
               <a:t>Third level</a:t>
             </a:r>
           </a:p>
           <a:p>
             <a:pPr lvl="3"/>
             <a:r>
-              <a:rPr lang="en-US"/>
+              <a:rPr lang="en-US" smtClean="0"/>
               <a:t>Fourth level</a:t>
             </a:r>
           </a:p>
           <a:p>
             <a:pPr lvl="4"/>
             <a:r>
-              <a:rPr lang="en-US"/>
+              <a:rPr lang="en-US" smtClean="0"/>
               <a:t>Fifth level</a:t>
             </a:r>
+            <a:endParaRPr lang="en-US"/>
           </a:p>
         </p:txBody>
       </p:sp>
@@ -1354,7 +1365,7 @@
           <a:p>
             <a:fld id="{241EB5C9-1307-BA42-ABA2-0BC069CD8E7F}" type="datetimeFigureOut">
               <a:rPr lang="en-US" smtClean="0"/>
-              <a:t>1/2/22</a:t>
+              <a:t>4/5/2019</a:t>
             </a:fld>
             <a:endParaRPr lang="en-US"/>
           </a:p>
@@ -1452,9 +1463,10 @@
           </a:lstStyle>
           <a:p>
             <a:r>
-              <a:rPr lang="en-US"/>
+              <a:rPr lang="en-US" smtClean="0"/>
               <a:t>Click to edit Master title style</a:t>
             </a:r>
+            <a:endParaRPr lang="en-US"/>
           </a:p>
         </p:txBody>
       </p:sp>
@@ -1470,8 +1482,8 @@
         </p:nvSpPr>
         <p:spPr>
           <a:xfrm>
-            <a:off x="457200" y="1151335"/>
-            <a:ext cx="4040188" cy="479822"/>
+            <a:off x="457200" y="1535113"/>
+            <a:ext cx="4040188" cy="639762"/>
           </a:xfrm>
         </p:spPr>
         <p:txBody>
@@ -1479,45 +1491,45 @@
           <a:lstStyle>
             <a:lvl1pPr marL="0" indent="0">
               <a:buNone/>
+              <a:defRPr sz="2400" b="1"/>
+            </a:lvl1pPr>
+            <a:lvl2pPr marL="457200" indent="0">
+              <a:buNone/>
+              <a:defRPr sz="2000" b="1"/>
+            </a:lvl2pPr>
+            <a:lvl3pPr marL="914400" indent="0">
+              <a:buNone/>
               <a:defRPr sz="1800" b="1"/>
-            </a:lvl1pPr>
-            <a:lvl2pPr marL="342900" indent="0">
-              <a:buNone/>
-              <a:defRPr sz="1500" b="1"/>
-            </a:lvl2pPr>
-            <a:lvl3pPr marL="685800" indent="0">
-              <a:buNone/>
-              <a:defRPr sz="1350" b="1"/>
             </a:lvl3pPr>
-            <a:lvl4pPr marL="1028700" indent="0">
-              <a:buNone/>
-              <a:defRPr sz="1200" b="1"/>
+            <a:lvl4pPr marL="1371600" indent="0">
+              <a:buNone/>
+              <a:defRPr sz="1600" b="1"/>
             </a:lvl4pPr>
-            <a:lvl5pPr marL="1371600" indent="0">
-              <a:buNone/>
-              <a:defRPr sz="1200" b="1"/>
+            <a:lvl5pPr marL="1828800" indent="0">
+              <a:buNone/>
+              <a:defRPr sz="1600" b="1"/>
             </a:lvl5pPr>
-            <a:lvl6pPr marL="1714500" indent="0">
-              <a:buNone/>
-              <a:defRPr sz="1200" b="1"/>
+            <a:lvl6pPr marL="2286000" indent="0">
+              <a:buNone/>
+              <a:defRPr sz="1600" b="1"/>
             </a:lvl6pPr>
-            <a:lvl7pPr marL="2057400" indent="0">
-              <a:buNone/>
-              <a:defRPr sz="1200" b="1"/>
+            <a:lvl7pPr marL="2743200" indent="0">
+              <a:buNone/>
+              <a:defRPr sz="1600" b="1"/>
             </a:lvl7pPr>
-            <a:lvl8pPr marL="2400300" indent="0">
-              <a:buNone/>
-              <a:defRPr sz="1200" b="1"/>
+            <a:lvl8pPr marL="3200400" indent="0">
+              <a:buNone/>
+              <a:defRPr sz="1600" b="1"/>
             </a:lvl8pPr>
-            <a:lvl9pPr marL="2743200" indent="0">
-              <a:buNone/>
-              <a:defRPr sz="1200" b="1"/>
+            <a:lvl9pPr marL="3657600" indent="0">
+              <a:buNone/>
+              <a:defRPr sz="1600" b="1"/>
             </a:lvl9pPr>
           </a:lstStyle>
           <a:p>
             <a:pPr lvl="0"/>
             <a:r>
-              <a:rPr lang="en-US"/>
+              <a:rPr lang="en-US" smtClean="0"/>
               <a:t>Click to edit Master text styles</a:t>
             </a:r>
           </a:p>
@@ -1535,75 +1547,76 @@
         </p:nvSpPr>
         <p:spPr>
           <a:xfrm>
-            <a:off x="457200" y="1631156"/>
-            <a:ext cx="4040188" cy="2963466"/>
+            <a:off x="457200" y="2174875"/>
+            <a:ext cx="4040188" cy="3951288"/>
           </a:xfrm>
         </p:spPr>
         <p:txBody>
           <a:bodyPr/>
           <a:lstStyle>
             <a:lvl1pPr>
-              <a:defRPr sz="1800"/>
+              <a:defRPr sz="2400"/>
             </a:lvl1pPr>
             <a:lvl2pPr>
-              <a:defRPr sz="1500"/>
+              <a:defRPr sz="2000"/>
             </a:lvl2pPr>
             <a:lvl3pPr>
-              <a:defRPr sz="1350"/>
+              <a:defRPr sz="1800"/>
             </a:lvl3pPr>
             <a:lvl4pPr>
-              <a:defRPr sz="1200"/>
+              <a:defRPr sz="1600"/>
             </a:lvl4pPr>
             <a:lvl5pPr>
-              <a:defRPr sz="1200"/>
+              <a:defRPr sz="1600"/>
             </a:lvl5pPr>
             <a:lvl6pPr>
-              <a:defRPr sz="1200"/>
+              <a:defRPr sz="1600"/>
             </a:lvl6pPr>
             <a:lvl7pPr>
-              <a:defRPr sz="1200"/>
+              <a:defRPr sz="1600"/>
             </a:lvl7pPr>
             <a:lvl8pPr>
-              <a:defRPr sz="1200"/>
+              <a:defRPr sz="1600"/>
             </a:lvl8pPr>
             <a:lvl9pPr>
-              <a:defRPr sz="1200"/>
+              <a:defRPr sz="1600"/>
             </a:lvl9pPr>
           </a:lstStyle>
           <a:p>
             <a:pPr lvl="0"/>
             <a:r>
-              <a:rPr lang="en-US"/>
+              <a:rPr lang="en-US" smtClean="0"/>
               <a:t>Click to edit Master text styles</a:t>
             </a:r>
           </a:p>
           <a:p>
             <a:pPr lvl="1"/>
             <a:r>
-              <a:rPr lang="en-US"/>
+              <a:rPr lang="en-US" smtClean="0"/>
               <a:t>Second level</a:t>
             </a:r>
           </a:p>
           <a:p>
             <a:pPr lvl="2"/>
             <a:r>
-              <a:rPr lang="en-US"/>
+              <a:rPr lang="en-US" smtClean="0"/>
               <a:t>Third level</a:t>
             </a:r>
           </a:p>
           <a:p>
             <a:pPr lvl="3"/>
             <a:r>
-              <a:rPr lang="en-US"/>
+              <a:rPr lang="en-US" smtClean="0"/>
               <a:t>Fourth level</a:t>
             </a:r>
           </a:p>
           <a:p>
             <a:pPr lvl="4"/>
             <a:r>
-              <a:rPr lang="en-US"/>
+              <a:rPr lang="en-US" smtClean="0"/>
               <a:t>Fifth level</a:t>
             </a:r>
+            <a:endParaRPr lang="en-US"/>
           </a:p>
         </p:txBody>
       </p:sp>
@@ -1619,8 +1632,8 @@
         </p:nvSpPr>
         <p:spPr>
           <a:xfrm>
-            <a:off x="4645026" y="1151335"/>
-            <a:ext cx="4041775" cy="479822"/>
+            <a:off x="4645025" y="1535113"/>
+            <a:ext cx="4041775" cy="639762"/>
           </a:xfrm>
         </p:spPr>
         <p:txBody>
@@ -1628,45 +1641,45 @@
           <a:lstStyle>
             <a:lvl1pPr marL="0" indent="0">
               <a:buNone/>
+              <a:defRPr sz="2400" b="1"/>
+            </a:lvl1pPr>
+            <a:lvl2pPr marL="457200" indent="0">
+              <a:buNone/>
+              <a:defRPr sz="2000" b="1"/>
+            </a:lvl2pPr>
+            <a:lvl3pPr marL="914400" indent="0">
+              <a:buNone/>
               <a:defRPr sz="1800" b="1"/>
-            </a:lvl1pPr>
-            <a:lvl2pPr marL="342900" indent="0">
-              <a:buNone/>
-              <a:defRPr sz="1500" b="1"/>
-            </a:lvl2pPr>
-            <a:lvl3pPr marL="685800" indent="0">
-              <a:buNone/>
-              <a:defRPr sz="1350" b="1"/>
             </a:lvl3pPr>
-            <a:lvl4pPr marL="1028700" indent="0">
-              <a:buNone/>
-              <a:defRPr sz="1200" b="1"/>
+            <a:lvl4pPr marL="1371600" indent="0">
+              <a:buNone/>
+              <a:defRPr sz="1600" b="1"/>
             </a:lvl4pPr>
-            <a:lvl5pPr marL="1371600" indent="0">
-              <a:buNone/>
-              <a:defRPr sz="1200" b="1"/>
+            <a:lvl5pPr marL="1828800" indent="0">
+              <a:buNone/>
+              <a:defRPr sz="1600" b="1"/>
             </a:lvl5pPr>
-            <a:lvl6pPr marL="1714500" indent="0">
-              <a:buNone/>
-              <a:defRPr sz="1200" b="1"/>
+            <a:lvl6pPr marL="2286000" indent="0">
+              <a:buNone/>
+              <a:defRPr sz="1600" b="1"/>
             </a:lvl6pPr>
-            <a:lvl7pPr marL="2057400" indent="0">
-              <a:buNone/>
-              <a:defRPr sz="1200" b="1"/>
+            <a:lvl7pPr marL="2743200" indent="0">
+              <a:buNone/>
+              <a:defRPr sz="1600" b="1"/>
             </a:lvl7pPr>
-            <a:lvl8pPr marL="2400300" indent="0">
-              <a:buNone/>
-              <a:defRPr sz="1200" b="1"/>
+            <a:lvl8pPr marL="3200400" indent="0">
+              <a:buNone/>
+              <a:defRPr sz="1600" b="1"/>
             </a:lvl8pPr>
-            <a:lvl9pPr marL="2743200" indent="0">
-              <a:buNone/>
-              <a:defRPr sz="1200" b="1"/>
+            <a:lvl9pPr marL="3657600" indent="0">
+              <a:buNone/>
+              <a:defRPr sz="1600" b="1"/>
             </a:lvl9pPr>
           </a:lstStyle>
           <a:p>
             <a:pPr lvl="0"/>
             <a:r>
-              <a:rPr lang="en-US"/>
+              <a:rPr lang="en-US" smtClean="0"/>
               <a:t>Click to edit Master text styles</a:t>
             </a:r>
           </a:p>
@@ -1684,75 +1697,76 @@
         </p:nvSpPr>
         <p:spPr>
           <a:xfrm>
-            <a:off x="4645026" y="1631156"/>
-            <a:ext cx="4041775" cy="2963466"/>
+            <a:off x="4645025" y="2174875"/>
+            <a:ext cx="4041775" cy="3951288"/>
           </a:xfrm>
         </p:spPr>
         <p:txBody>
           <a:bodyPr/>
           <a:lstStyle>
             <a:lvl1pPr>
-              <a:defRPr sz="1800"/>
+              <a:defRPr sz="2400"/>
             </a:lvl1pPr>
             <a:lvl2pPr>
-              <a:defRPr sz="1500"/>
+              <a:defRPr sz="2000"/>
             </a:lvl2pPr>
             <a:lvl3pPr>
-              <a:defRPr sz="1350"/>
+              <a:defRPr sz="1800"/>
             </a:lvl3pPr>
             <a:lvl4pPr>
-              <a:defRPr sz="1200"/>
+              <a:defRPr sz="1600"/>
             </a:lvl4pPr>
             <a:lvl5pPr>
-              <a:defRPr sz="1200"/>
+              <a:defRPr sz="1600"/>
             </a:lvl5pPr>
             <a:lvl6pPr>
-              <a:defRPr sz="1200"/>
+              <a:defRPr sz="1600"/>
             </a:lvl6pPr>
             <a:lvl7pPr>
-              <a:defRPr sz="1200"/>
+              <a:defRPr sz="1600"/>
             </a:lvl7pPr>
             <a:lvl8pPr>
-              <a:defRPr sz="1200"/>
+              <a:defRPr sz="1600"/>
             </a:lvl8pPr>
             <a:lvl9pPr>
-              <a:defRPr sz="1200"/>
+              <a:defRPr sz="1600"/>
             </a:lvl9pPr>
           </a:lstStyle>
           <a:p>
             <a:pPr lvl="0"/>
             <a:r>
-              <a:rPr lang="en-US"/>
+              <a:rPr lang="en-US" smtClean="0"/>
               <a:t>Click to edit Master text styles</a:t>
             </a:r>
           </a:p>
           <a:p>
             <a:pPr lvl="1"/>
             <a:r>
-              <a:rPr lang="en-US"/>
+              <a:rPr lang="en-US" smtClean="0"/>
               <a:t>Second level</a:t>
             </a:r>
           </a:p>
           <a:p>
             <a:pPr lvl="2"/>
             <a:r>
-              <a:rPr lang="en-US"/>
+              <a:rPr lang="en-US" smtClean="0"/>
               <a:t>Third level</a:t>
             </a:r>
           </a:p>
           <a:p>
             <a:pPr lvl="3"/>
             <a:r>
-              <a:rPr lang="en-US"/>
+              <a:rPr lang="en-US" smtClean="0"/>
               <a:t>Fourth level</a:t>
             </a:r>
           </a:p>
           <a:p>
             <a:pPr lvl="4"/>
             <a:r>
-              <a:rPr lang="en-US"/>
+              <a:rPr lang="en-US" smtClean="0"/>
               <a:t>Fifth level</a:t>
             </a:r>
+            <a:endParaRPr lang="en-US"/>
           </a:p>
         </p:txBody>
       </p:sp>
@@ -1773,7 +1787,7 @@
           <a:p>
             <a:fld id="{241EB5C9-1307-BA42-ABA2-0BC069CD8E7F}" type="datetimeFigureOut">
               <a:rPr lang="en-US" smtClean="0"/>
-              <a:t>1/2/22</a:t>
+              <a:t>4/5/2019</a:t>
             </a:fld>
             <a:endParaRPr lang="en-US"/>
           </a:p>
@@ -1867,9 +1881,10 @@
           <a:lstStyle/>
           <a:p>
             <a:r>
-              <a:rPr lang="en-US"/>
+              <a:rPr lang="en-US" smtClean="0"/>
               <a:t>Click to edit Master title style</a:t>
             </a:r>
+            <a:endParaRPr lang="en-US"/>
           </a:p>
         </p:txBody>
       </p:sp>
@@ -1890,7 +1905,7 @@
           <a:p>
             <a:fld id="{241EB5C9-1307-BA42-ABA2-0BC069CD8E7F}" type="datetimeFigureOut">
               <a:rPr lang="en-US" smtClean="0"/>
-              <a:t>1/2/22</a:t>
+              <a:t>4/5/2019</a:t>
             </a:fld>
             <a:endParaRPr lang="en-US"/>
           </a:p>
@@ -1985,7 +2000,7 @@
           <a:p>
             <a:fld id="{241EB5C9-1307-BA42-ABA2-0BC069CD8E7F}" type="datetimeFigureOut">
               <a:rPr lang="en-US" smtClean="0"/>
-              <a:t>1/2/22</a:t>
+              <a:t>4/5/2019</a:t>
             </a:fld>
             <a:endParaRPr lang="en-US"/>
           </a:p>
@@ -2075,22 +2090,23 @@
         </p:nvSpPr>
         <p:spPr>
           <a:xfrm>
-            <a:off x="457201" y="204787"/>
-            <a:ext cx="3008313" cy="871538"/>
+            <a:off x="457200" y="273050"/>
+            <a:ext cx="3008313" cy="1162050"/>
           </a:xfrm>
         </p:spPr>
         <p:txBody>
           <a:bodyPr anchor="b"/>
           <a:lstStyle>
             <a:lvl1pPr algn="l">
-              <a:defRPr sz="1500" b="1"/>
+              <a:defRPr sz="2000" b="1"/>
             </a:lvl1pPr>
           </a:lstStyle>
           <a:p>
             <a:r>
-              <a:rPr lang="en-US"/>
+              <a:rPr lang="en-US" smtClean="0"/>
               <a:t>Click to edit Master title style</a:t>
             </a:r>
+            <a:endParaRPr lang="en-US"/>
           </a:p>
         </p:txBody>
       </p:sp>
@@ -2106,75 +2122,76 @@
         </p:nvSpPr>
         <p:spPr>
           <a:xfrm>
-            <a:off x="3575050" y="204788"/>
-            <a:ext cx="5111750" cy="4389835"/>
+            <a:off x="3575050" y="273050"/>
+            <a:ext cx="5111750" cy="5853113"/>
           </a:xfrm>
         </p:spPr>
         <p:txBody>
           <a:bodyPr/>
           <a:lstStyle>
             <a:lvl1pPr>
-              <a:defRPr sz="2400"/>
+              <a:defRPr sz="3200"/>
             </a:lvl1pPr>
             <a:lvl2pPr>
-              <a:defRPr sz="2100"/>
+              <a:defRPr sz="2800"/>
             </a:lvl2pPr>
             <a:lvl3pPr>
-              <a:defRPr sz="1800"/>
+              <a:defRPr sz="2400"/>
             </a:lvl3pPr>
             <a:lvl4pPr>
-              <a:defRPr sz="1500"/>
+              <a:defRPr sz="2000"/>
             </a:lvl4pPr>
             <a:lvl5pPr>
-              <a:defRPr sz="1500"/>
+              <a:defRPr sz="2000"/>
             </a:lvl5pPr>
             <a:lvl6pPr>
-              <a:defRPr sz="1500"/>
+              <a:defRPr sz="2000"/>
             </a:lvl6pPr>
             <a:lvl7pPr>
-              <a:defRPr sz="1500"/>
+              <a:defRPr sz="2000"/>
             </a:lvl7pPr>
             <a:lvl8pPr>
-              <a:defRPr sz="1500"/>
+              <a:defRPr sz="2000"/>
             </a:lvl8pPr>
             <a:lvl9pPr>
-              <a:defRPr sz="1500"/>
+              <a:defRPr sz="2000"/>
             </a:lvl9pPr>
           </a:lstStyle>
           <a:p>
             <a:pPr lvl="0"/>
             <a:r>
-              <a:rPr lang="en-US"/>
+              <a:rPr lang="en-US" smtClean="0"/>
               <a:t>Click to edit Master text styles</a:t>
             </a:r>
           </a:p>
           <a:p>
             <a:pPr lvl="1"/>
             <a:r>
-              <a:rPr lang="en-US"/>
+              <a:rPr lang="en-US" smtClean="0"/>
               <a:t>Second level</a:t>
             </a:r>
           </a:p>
           <a:p>
             <a:pPr lvl="2"/>
             <a:r>
-              <a:rPr lang="en-US"/>
+              <a:rPr lang="en-US" smtClean="0"/>
               <a:t>Third level</a:t>
             </a:r>
           </a:p>
           <a:p>
             <a:pPr lvl="3"/>
             <a:r>
-              <a:rPr lang="en-US"/>
+              <a:rPr lang="en-US" smtClean="0"/>
               <a:t>Fourth level</a:t>
             </a:r>
           </a:p>
           <a:p>
             <a:pPr lvl="4"/>
             <a:r>
-              <a:rPr lang="en-US"/>
+              <a:rPr lang="en-US" smtClean="0"/>
               <a:t>Fifth level</a:t>
             </a:r>
+            <a:endParaRPr lang="en-US"/>
           </a:p>
         </p:txBody>
       </p:sp>
@@ -2190,8 +2207,8 @@
         </p:nvSpPr>
         <p:spPr>
           <a:xfrm>
-            <a:off x="457201" y="1076326"/>
-            <a:ext cx="3008313" cy="3518297"/>
+            <a:off x="457200" y="1435100"/>
+            <a:ext cx="3008313" cy="4691063"/>
           </a:xfrm>
         </p:spPr>
         <p:txBody>
@@ -2199,45 +2216,45 @@
           <a:lstStyle>
             <a:lvl1pPr marL="0" indent="0">
               <a:buNone/>
-              <a:defRPr sz="1050"/>
+              <a:defRPr sz="1400"/>
             </a:lvl1pPr>
-            <a:lvl2pPr marL="342900" indent="0">
+            <a:lvl2pPr marL="457200" indent="0">
+              <a:buNone/>
+              <a:defRPr sz="1200"/>
+            </a:lvl2pPr>
+            <a:lvl3pPr marL="914400" indent="0">
+              <a:buNone/>
+              <a:defRPr sz="1000"/>
+            </a:lvl3pPr>
+            <a:lvl4pPr marL="1371600" indent="0">
               <a:buNone/>
               <a:defRPr sz="900"/>
-            </a:lvl2pPr>
-            <a:lvl3pPr marL="685800" indent="0">
-              <a:buNone/>
-              <a:defRPr sz="750"/>
-            </a:lvl3pPr>
-            <a:lvl4pPr marL="1028700" indent="0">
-              <a:buNone/>
-              <a:defRPr sz="675"/>
             </a:lvl4pPr>
-            <a:lvl5pPr marL="1371600" indent="0">
-              <a:buNone/>
-              <a:defRPr sz="675"/>
+            <a:lvl5pPr marL="1828800" indent="0">
+              <a:buNone/>
+              <a:defRPr sz="900"/>
             </a:lvl5pPr>
-            <a:lvl6pPr marL="1714500" indent="0">
-              <a:buNone/>
-              <a:defRPr sz="675"/>
+            <a:lvl6pPr marL="2286000" indent="0">
+              <a:buNone/>
+              <a:defRPr sz="900"/>
             </a:lvl6pPr>
-            <a:lvl7pPr marL="2057400" indent="0">
-              <a:buNone/>
-              <a:defRPr sz="675"/>
+            <a:lvl7pPr marL="2743200" indent="0">
+              <a:buNone/>
+              <a:defRPr sz="900"/>
             </a:lvl7pPr>
-            <a:lvl8pPr marL="2400300" indent="0">
-              <a:buNone/>
-              <a:defRPr sz="675"/>
+            <a:lvl8pPr marL="3200400" indent="0">
+              <a:buNone/>
+              <a:defRPr sz="900"/>
             </a:lvl8pPr>
-            <a:lvl9pPr marL="2743200" indent="0">
-              <a:buNone/>
-              <a:defRPr sz="675"/>
+            <a:lvl9pPr marL="3657600" indent="0">
+              <a:buNone/>
+              <a:defRPr sz="900"/>
             </a:lvl9pPr>
           </a:lstStyle>
           <a:p>
             <a:pPr lvl="0"/>
             <a:r>
-              <a:rPr lang="en-US"/>
+              <a:rPr lang="en-US" smtClean="0"/>
               <a:t>Click to edit Master text styles</a:t>
             </a:r>
           </a:p>
@@ -2260,7 +2277,7 @@
           <a:p>
             <a:fld id="{241EB5C9-1307-BA42-ABA2-0BC069CD8E7F}" type="datetimeFigureOut">
               <a:rPr lang="en-US" smtClean="0"/>
-              <a:t>1/2/22</a:t>
+              <a:t>4/5/2019</a:t>
             </a:fld>
             <a:endParaRPr lang="en-US"/>
           </a:p>
@@ -2350,22 +2367,23 @@
         </p:nvSpPr>
         <p:spPr>
           <a:xfrm>
-            <a:off x="1792288" y="3600450"/>
-            <a:ext cx="5486400" cy="425054"/>
+            <a:off x="1792288" y="4800600"/>
+            <a:ext cx="5486400" cy="566738"/>
           </a:xfrm>
         </p:spPr>
         <p:txBody>
           <a:bodyPr anchor="b"/>
           <a:lstStyle>
             <a:lvl1pPr algn="l">
-              <a:defRPr sz="1500" b="1"/>
+              <a:defRPr sz="2000" b="1"/>
             </a:lvl1pPr>
           </a:lstStyle>
           <a:p>
             <a:r>
-              <a:rPr lang="en-US"/>
+              <a:rPr lang="en-US" smtClean="0"/>
               <a:t>Click to edit Master title style</a:t>
             </a:r>
+            <a:endParaRPr lang="en-US"/>
           </a:p>
         </p:txBody>
       </p:sp>
@@ -2381,8 +2399,8 @@
         </p:nvSpPr>
         <p:spPr>
           <a:xfrm>
-            <a:off x="1792288" y="459581"/>
-            <a:ext cx="5486400" cy="3086100"/>
+            <a:off x="1792288" y="612775"/>
+            <a:ext cx="5486400" cy="4114800"/>
           </a:xfrm>
         </p:spPr>
         <p:txBody>
@@ -2390,39 +2408,39 @@
           <a:lstStyle>
             <a:lvl1pPr marL="0" indent="0">
               <a:buNone/>
+              <a:defRPr sz="3200"/>
+            </a:lvl1pPr>
+            <a:lvl2pPr marL="457200" indent="0">
+              <a:buNone/>
+              <a:defRPr sz="2800"/>
+            </a:lvl2pPr>
+            <a:lvl3pPr marL="914400" indent="0">
+              <a:buNone/>
               <a:defRPr sz="2400"/>
-            </a:lvl1pPr>
-            <a:lvl2pPr marL="342900" indent="0">
-              <a:buNone/>
-              <a:defRPr sz="2100"/>
-            </a:lvl2pPr>
-            <a:lvl3pPr marL="685800" indent="0">
-              <a:buNone/>
-              <a:defRPr sz="1800"/>
             </a:lvl3pPr>
-            <a:lvl4pPr marL="1028700" indent="0">
-              <a:buNone/>
-              <a:defRPr sz="1500"/>
+            <a:lvl4pPr marL="1371600" indent="0">
+              <a:buNone/>
+              <a:defRPr sz="2000"/>
             </a:lvl4pPr>
-            <a:lvl5pPr marL="1371600" indent="0">
-              <a:buNone/>
-              <a:defRPr sz="1500"/>
+            <a:lvl5pPr marL="1828800" indent="0">
+              <a:buNone/>
+              <a:defRPr sz="2000"/>
             </a:lvl5pPr>
-            <a:lvl6pPr marL="1714500" indent="0">
-              <a:buNone/>
-              <a:defRPr sz="1500"/>
+            <a:lvl6pPr marL="2286000" indent="0">
+              <a:buNone/>
+              <a:defRPr sz="2000"/>
             </a:lvl6pPr>
-            <a:lvl7pPr marL="2057400" indent="0">
-              <a:buNone/>
-              <a:defRPr sz="1500"/>
+            <a:lvl7pPr marL="2743200" indent="0">
+              <a:buNone/>
+              <a:defRPr sz="2000"/>
             </a:lvl7pPr>
-            <a:lvl8pPr marL="2400300" indent="0">
-              <a:buNone/>
-              <a:defRPr sz="1500"/>
+            <a:lvl8pPr marL="3200400" indent="0">
+              <a:buNone/>
+              <a:defRPr sz="2000"/>
             </a:lvl8pPr>
-            <a:lvl9pPr marL="2743200" indent="0">
-              <a:buNone/>
-              <a:defRPr sz="1500"/>
+            <a:lvl9pPr marL="3657600" indent="0">
+              <a:buNone/>
+              <a:defRPr sz="2000"/>
             </a:lvl9pPr>
           </a:lstStyle>
           <a:p>
@@ -2442,8 +2460,8 @@
         </p:nvSpPr>
         <p:spPr>
           <a:xfrm>
-            <a:off x="1792288" y="4025503"/>
-            <a:ext cx="5486400" cy="603647"/>
+            <a:off x="1792288" y="5367338"/>
+            <a:ext cx="5486400" cy="804862"/>
           </a:xfrm>
         </p:spPr>
         <p:txBody>
@@ -2451,45 +2469,45 @@
           <a:lstStyle>
             <a:lvl1pPr marL="0" indent="0">
               <a:buNone/>
-              <a:defRPr sz="1050"/>
+              <a:defRPr sz="1400"/>
             </a:lvl1pPr>
-            <a:lvl2pPr marL="342900" indent="0">
+            <a:lvl2pPr marL="457200" indent="0">
+              <a:buNone/>
+              <a:defRPr sz="1200"/>
+            </a:lvl2pPr>
+            <a:lvl3pPr marL="914400" indent="0">
+              <a:buNone/>
+              <a:defRPr sz="1000"/>
+            </a:lvl3pPr>
+            <a:lvl4pPr marL="1371600" indent="0">
               <a:buNone/>
               <a:defRPr sz="900"/>
-            </a:lvl2pPr>
-            <a:lvl3pPr marL="685800" indent="0">
-              <a:buNone/>
-              <a:defRPr sz="750"/>
-            </a:lvl3pPr>
-            <a:lvl4pPr marL="1028700" indent="0">
-              <a:buNone/>
-              <a:defRPr sz="675"/>
             </a:lvl4pPr>
-            <a:lvl5pPr marL="1371600" indent="0">
-              <a:buNone/>
-              <a:defRPr sz="675"/>
+            <a:lvl5pPr marL="1828800" indent="0">
+              <a:buNone/>
+              <a:defRPr sz="900"/>
             </a:lvl5pPr>
-            <a:lvl6pPr marL="1714500" indent="0">
-              <a:buNone/>
-              <a:defRPr sz="675"/>
+            <a:lvl6pPr marL="2286000" indent="0">
+              <a:buNone/>
+              <a:defRPr sz="900"/>
             </a:lvl6pPr>
-            <a:lvl7pPr marL="2057400" indent="0">
-              <a:buNone/>
-              <a:defRPr sz="675"/>
+            <a:lvl7pPr marL="2743200" indent="0">
+              <a:buNone/>
+              <a:defRPr sz="900"/>
             </a:lvl7pPr>
-            <a:lvl8pPr marL="2400300" indent="0">
-              <a:buNone/>
-              <a:defRPr sz="675"/>
+            <a:lvl8pPr marL="3200400" indent="0">
+              <a:buNone/>
+              <a:defRPr sz="900"/>
             </a:lvl8pPr>
-            <a:lvl9pPr marL="2743200" indent="0">
-              <a:buNone/>
-              <a:defRPr sz="675"/>
+            <a:lvl9pPr marL="3657600" indent="0">
+              <a:buNone/>
+              <a:defRPr sz="900"/>
             </a:lvl9pPr>
           </a:lstStyle>
           <a:p>
             <a:pPr lvl="0"/>
             <a:r>
-              <a:rPr lang="en-US"/>
+              <a:rPr lang="en-US" smtClean="0"/>
               <a:t>Click to edit Master text styles</a:t>
             </a:r>
           </a:p>
@@ -2512,7 +2530,7 @@
           <a:p>
             <a:fld id="{241EB5C9-1307-BA42-ABA2-0BC069CD8E7F}" type="datetimeFigureOut">
               <a:rPr lang="en-US" smtClean="0"/>
-              <a:t>1/2/22</a:t>
+              <a:t>4/5/2019</a:t>
             </a:fld>
             <a:endParaRPr lang="en-US"/>
           </a:p>
@@ -2574,7 +2592,7 @@
 </file>
 
 <file path=ppt/slideMasters/slideMaster1.xml><?xml version="1.0" encoding="utf-8"?>
-<p:sldMaster xmlns:a="http://schemas.openxmlformats.org/drawingml/2006/main" xmlns:p="http://schemas.openxmlformats.org/presentationml/2006/main" xmlns:r="http://schemas.openxmlformats.org/officeDocument/2006/relationships">
+<p:sldMaster xmlns:a="http://schemas.openxmlformats.org/drawingml/2006/main" xmlns:r="http://schemas.openxmlformats.org/officeDocument/2006/relationships" xmlns:p="http://schemas.openxmlformats.org/presentationml/2006/main">
   <p:cSld>
     <p:bg>
       <p:bgRef idx="1001">
@@ -2607,23 +2625,24 @@
         </p:nvSpPr>
         <p:spPr>
           <a:xfrm>
-            <a:off x="457200" y="205979"/>
-            <a:ext cx="8229600" cy="857250"/>
+            <a:off x="457200" y="274638"/>
+            <a:ext cx="8229600" cy="1143000"/>
           </a:xfrm>
           <a:prstGeom prst="rect">
             <a:avLst/>
           </a:prstGeom>
         </p:spPr>
         <p:txBody>
-          <a:bodyPr anchor="ctr" bIns="45720" lIns="91440" rIns="91440" rtlCol="0" tIns="45720" vert="horz">
+          <a:bodyPr vert="horz" lIns="91440" tIns="45720" rIns="91440" bIns="45720" rtlCol="0" anchor="ctr">
             <a:normAutofit/>
           </a:bodyPr>
           <a:lstStyle/>
           <a:p>
             <a:r>
-              <a:rPr lang="en-US"/>
+              <a:rPr lang="en-US" smtClean="0"/>
               <a:t>Click to edit Master title style</a:t>
             </a:r>
+            <a:endParaRPr lang="en-US"/>
           </a:p>
         </p:txBody>
       </p:sp>
@@ -2634,57 +2653,58 @@
             <a:spLocks noGrp="1"/>
           </p:cNvSpPr>
           <p:nvPr>
-            <p:ph idx="1" type="body"/>
+            <p:ph type="body" idx="1"/>
           </p:nvPr>
         </p:nvSpPr>
         <p:spPr>
           <a:xfrm>
-            <a:off x="457200" y="1200151"/>
-            <a:ext cx="8229600" cy="3394472"/>
+            <a:off x="457200" y="1600200"/>
+            <a:ext cx="8229600" cy="4525963"/>
           </a:xfrm>
           <a:prstGeom prst="rect">
             <a:avLst/>
           </a:prstGeom>
         </p:spPr>
         <p:txBody>
-          <a:bodyPr bIns="45720" lIns="91440" rIns="91440" rtlCol="0" tIns="45720" vert="horz">
+          <a:bodyPr vert="horz" lIns="91440" tIns="45720" rIns="91440" bIns="45720" rtlCol="0">
             <a:normAutofit/>
           </a:bodyPr>
           <a:lstStyle/>
           <a:p>
             <a:pPr lvl="0"/>
             <a:r>
-              <a:rPr lang="en-US"/>
+              <a:rPr lang="en-US" smtClean="0"/>
               <a:t>Click to edit Master text styles</a:t>
             </a:r>
           </a:p>
           <a:p>
             <a:pPr lvl="1"/>
             <a:r>
-              <a:rPr lang="en-US"/>
+              <a:rPr lang="en-US" smtClean="0"/>
               <a:t>Second level</a:t>
             </a:r>
           </a:p>
           <a:p>
             <a:pPr lvl="2"/>
             <a:r>
-              <a:rPr lang="en-US"/>
+              <a:rPr lang="en-US" smtClean="0"/>
               <a:t>Third level</a:t>
             </a:r>
           </a:p>
           <a:p>
             <a:pPr lvl="3"/>
             <a:r>
-              <a:rPr lang="en-US"/>
+              <a:rPr lang="en-US" smtClean="0"/>
               <a:t>Fourth level</a:t>
             </a:r>
           </a:p>
           <a:p>
             <a:pPr lvl="4"/>
             <a:r>
-              <a:rPr lang="en-US"/>
+              <a:rPr lang="en-US" smtClean="0"/>
               <a:t>Fifth level</a:t>
             </a:r>
+            <a:endParaRPr lang="en-US"/>
           </a:p>
         </p:txBody>
       </p:sp>
@@ -2695,23 +2715,23 @@
             <a:spLocks noGrp="1"/>
           </p:cNvSpPr>
           <p:nvPr>
-            <p:ph idx="2" sz="half" type="dt"/>
+            <p:ph type="dt" sz="half" idx="2"/>
           </p:nvPr>
         </p:nvSpPr>
         <p:spPr>
           <a:xfrm>
-            <a:off x="457200" y="4767263"/>
-            <a:ext cx="2133600" cy="273844"/>
+            <a:off x="457200" y="6356350"/>
+            <a:ext cx="2133600" cy="365125"/>
           </a:xfrm>
           <a:prstGeom prst="rect">
             <a:avLst/>
           </a:prstGeom>
         </p:spPr>
         <p:txBody>
-          <a:bodyPr anchor="ctr" bIns="45720" lIns="91440" rIns="91440" rtlCol="0" tIns="45720" vert="horz"/>
+          <a:bodyPr vert="horz" lIns="91440" tIns="45720" rIns="91440" bIns="45720" rtlCol="0" anchor="ctr"/>
           <a:lstStyle>
             <a:lvl1pPr algn="l">
-              <a:defRPr sz="900">
+              <a:defRPr sz="1200">
                 <a:solidFill>
                   <a:schemeClr val="tx1">
                     <a:tint val="75000"/>
@@ -2723,7 +2743,7 @@
           <a:p>
             <a:fld id="{241EB5C9-1307-BA42-ABA2-0BC069CD8E7F}" type="datetimeFigureOut">
               <a:rPr lang="en-US" smtClean="0"/>
-              <a:t>1/2/22</a:t>
+              <a:t>4/5/2019</a:t>
             </a:fld>
             <a:endParaRPr lang="en-US"/>
           </a:p>
@@ -2736,23 +2756,23 @@
             <a:spLocks noGrp="1"/>
           </p:cNvSpPr>
           <p:nvPr>
-            <p:ph idx="3" sz="quarter" type="ftr"/>
+            <p:ph type="ftr" sz="quarter" idx="3"/>
           </p:nvPr>
         </p:nvSpPr>
         <p:spPr>
           <a:xfrm>
-            <a:off x="3124200" y="4767263"/>
-            <a:ext cx="2895600" cy="273844"/>
+            <a:off x="3124200" y="6356350"/>
+            <a:ext cx="2895600" cy="365125"/>
           </a:xfrm>
           <a:prstGeom prst="rect">
             <a:avLst/>
           </a:prstGeom>
         </p:spPr>
         <p:txBody>
-          <a:bodyPr anchor="ctr" bIns="45720" lIns="91440" rIns="91440" rtlCol="0" tIns="45720" vert="horz"/>
+          <a:bodyPr vert="horz" lIns="91440" tIns="45720" rIns="91440" bIns="45720" rtlCol="0" anchor="ctr"/>
           <a:lstStyle>
             <a:lvl1pPr algn="ctr">
-              <a:defRPr sz="900">
+              <a:defRPr sz="1200">
                 <a:solidFill>
                   <a:schemeClr val="tx1">
                     <a:tint val="75000"/>
@@ -2773,23 +2793,23 @@
             <a:spLocks noGrp="1"/>
           </p:cNvSpPr>
           <p:nvPr>
-            <p:ph idx="4" sz="quarter" type="sldNum"/>
+            <p:ph type="sldNum" sz="quarter" idx="4"/>
           </p:nvPr>
         </p:nvSpPr>
         <p:spPr>
           <a:xfrm>
-            <a:off x="6553200" y="4767263"/>
-            <a:ext cx="2133600" cy="273844"/>
+            <a:off x="6553200" y="6356350"/>
+            <a:ext cx="2133600" cy="365125"/>
           </a:xfrm>
           <a:prstGeom prst="rect">
             <a:avLst/>
           </a:prstGeom>
         </p:spPr>
         <p:txBody>
-          <a:bodyPr anchor="ctr" bIns="45720" lIns="91440" rIns="91440" rtlCol="0" tIns="45720" vert="horz"/>
+          <a:bodyPr vert="horz" lIns="91440" tIns="45720" rIns="91440" bIns="45720" rtlCol="0" anchor="ctr"/>
           <a:lstStyle>
             <a:lvl1pPr algn="r">
-              <a:defRPr sz="900">
+              <a:defRPr sz="1200">
                 <a:solidFill>
                   <a:schemeClr val="tx1">
                     <a:tint val="75000"/>
@@ -2814,7 +2834,7 @@
       </p:ext>
     </p:extLst>
   </p:cSld>
-  <p:clrMap accent1="accent1" accent2="accent2" accent3="accent3" accent4="accent4" accent5="accent5" accent6="accent6" bg1="lt1" bg2="lt2" folHlink="folHlink" hlink="hlink" tx1="dk1" tx2="dk2"/>
+  <p:clrMap bg1="lt1" tx1="dk1" bg2="lt2" tx2="dk2" accent1="accent1" accent2="accent2" accent3="accent3" accent4="accent4" accent5="accent5" accent6="accent6" hlink="hlink" folHlink="folHlink"/>
   <p:sldLayoutIdLst>
     <p:sldLayoutId id="2147483649" r:id="rId1"/>
     <p:sldLayoutId id="2147483650" r:id="rId2"/>
@@ -2830,12 +2850,12 @@
   </p:sldLayoutIdLst>
   <p:txStyles>
     <p:titleStyle>
-      <a:lvl1pPr algn="ctr" defTabSz="342900" eaLnBrk="1" hangingPunct="1" latinLnBrk="0" rtl="0">
+      <a:lvl1pPr algn="ctr" defTabSz="457200" rtl="0" eaLnBrk="1" latinLnBrk="0" hangingPunct="1">
         <a:spcBef>
           <a:spcPct val="0"/>
         </a:spcBef>
         <a:buNone/>
-        <a:defRPr kern="1200" sz="3300">
+        <a:defRPr sz="4400" kern="1200">
           <a:solidFill>
             <a:schemeClr val="tx1"/>
           </a:solidFill>
@@ -2846,13 +2866,13 @@
       </a:lvl1pPr>
     </p:titleStyle>
     <p:bodyStyle>
-      <a:lvl1pPr algn="l" defTabSz="342900" eaLnBrk="1" hangingPunct="1" indent="-342900" latinLnBrk="0" marL="342900" rtl="0">
+      <a:lvl1pPr marL="342900" indent="-342900" algn="l" defTabSz="457200" rtl="0" eaLnBrk="1" latinLnBrk="0" hangingPunct="1">
         <a:spcBef>
           <a:spcPct val="20000"/>
         </a:spcBef>
         <a:buFont typeface="Arial"/>
         <a:buChar char="•"/>
-        <a:defRPr kern="1200" sz="2400">
+        <a:defRPr sz="3200" kern="1200">
           <a:solidFill>
             <a:schemeClr val="tx1"/>
           </a:solidFill>
@@ -2861,13 +2881,13 @@
           <a:cs typeface="+mn-cs"/>
         </a:defRPr>
       </a:lvl1pPr>
-      <a:lvl2pPr algn="l" defTabSz="342900" eaLnBrk="1" hangingPunct="1" indent="-342900" latinLnBrk="0" marL="685800" rtl="0">
+      <a:lvl2pPr marL="742950" indent="-285750" algn="l" defTabSz="457200" rtl="0" eaLnBrk="1" latinLnBrk="0" hangingPunct="1">
         <a:spcBef>
           <a:spcPct val="20000"/>
         </a:spcBef>
         <a:buFont typeface="Arial"/>
         <a:buChar char="–"/>
-        <a:defRPr kern="1200" sz="2100">
+        <a:defRPr sz="2800" kern="1200">
           <a:solidFill>
             <a:schemeClr val="tx1"/>
           </a:solidFill>
@@ -2876,13 +2896,13 @@
           <a:cs typeface="+mn-cs"/>
         </a:defRPr>
       </a:lvl2pPr>
-      <a:lvl3pPr algn="l" defTabSz="342900" eaLnBrk="1" hangingPunct="1" indent="-342900" latinLnBrk="0" marL="1028700" rtl="0">
+      <a:lvl3pPr marL="1143000" indent="-228600" algn="l" defTabSz="457200" rtl="0" eaLnBrk="1" latinLnBrk="0" hangingPunct="1">
         <a:spcBef>
           <a:spcPct val="20000"/>
         </a:spcBef>
         <a:buFont typeface="Arial"/>
         <a:buChar char="•"/>
-        <a:defRPr kern="1200" sz="1800">
+        <a:defRPr sz="2400" kern="1200">
           <a:solidFill>
             <a:schemeClr val="tx1"/>
           </a:solidFill>
@@ -2891,13 +2911,13 @@
           <a:cs typeface="+mn-cs"/>
         </a:defRPr>
       </a:lvl3pPr>
-      <a:lvl4pPr algn="l" defTabSz="342900" eaLnBrk="1" hangingPunct="1" indent="-342900" latinLnBrk="0" marL="1371600" rtl="0">
+      <a:lvl4pPr marL="1600200" indent="-228600" algn="l" defTabSz="457200" rtl="0" eaLnBrk="1" latinLnBrk="0" hangingPunct="1">
         <a:spcBef>
           <a:spcPct val="20000"/>
         </a:spcBef>
         <a:buFont typeface="Arial"/>
         <a:buChar char="–"/>
-        <a:defRPr kern="1200" sz="1500">
+        <a:defRPr sz="2000" kern="1200">
           <a:solidFill>
             <a:schemeClr val="tx1"/>
           </a:solidFill>
@@ -2906,13 +2926,13 @@
           <a:cs typeface="+mn-cs"/>
         </a:defRPr>
       </a:lvl4pPr>
-      <a:lvl5pPr algn="l" defTabSz="342900" eaLnBrk="1" hangingPunct="1" indent="-342900" latinLnBrk="0" marL="1714500" rtl="0">
+      <a:lvl5pPr marL="2057400" indent="-228600" algn="l" defTabSz="457200" rtl="0" eaLnBrk="1" latinLnBrk="0" hangingPunct="1">
         <a:spcBef>
           <a:spcPct val="20000"/>
         </a:spcBef>
         <a:buFont typeface="Arial"/>
         <a:buChar char="»"/>
-        <a:defRPr kern="1200" sz="1500">
+        <a:defRPr sz="2000" kern="1200">
           <a:solidFill>
             <a:schemeClr val="tx1"/>
           </a:solidFill>
@@ -2921,13 +2941,13 @@
           <a:cs typeface="+mn-cs"/>
         </a:defRPr>
       </a:lvl5pPr>
-      <a:lvl6pPr algn="l" defTabSz="342900" eaLnBrk="1" hangingPunct="1" indent="-342900" latinLnBrk="0" marL="2057400" rtl="0">
+      <a:lvl6pPr marL="2514600" indent="-228600" algn="l" defTabSz="457200" rtl="0" eaLnBrk="1" latinLnBrk="0" hangingPunct="1">
         <a:spcBef>
           <a:spcPct val="20000"/>
         </a:spcBef>
         <a:buFont typeface="Arial"/>
         <a:buChar char="•"/>
-        <a:defRPr kern="1200" sz="1500">
+        <a:defRPr sz="2000" kern="1200">
           <a:solidFill>
             <a:schemeClr val="tx1"/>
           </a:solidFill>
@@ -2936,13 +2956,13 @@
           <a:cs typeface="+mn-cs"/>
         </a:defRPr>
       </a:lvl6pPr>
-      <a:lvl7pPr algn="l" defTabSz="342900" eaLnBrk="1" hangingPunct="1" indent="-342900" latinLnBrk="0" marL="2400300" rtl="0">
+      <a:lvl7pPr marL="2971800" indent="-228600" algn="l" defTabSz="457200" rtl="0" eaLnBrk="1" latinLnBrk="0" hangingPunct="1">
         <a:spcBef>
           <a:spcPct val="20000"/>
         </a:spcBef>
         <a:buFont typeface="Arial"/>
         <a:buChar char="•"/>
-        <a:defRPr kern="1200" sz="1500">
+        <a:defRPr sz="2000" kern="1200">
           <a:solidFill>
             <a:schemeClr val="tx1"/>
           </a:solidFill>
@@ -2951,13 +2971,13 @@
           <a:cs typeface="+mn-cs"/>
         </a:defRPr>
       </a:lvl7pPr>
-      <a:lvl8pPr algn="l" defTabSz="342900" eaLnBrk="1" hangingPunct="1" indent="-342900" latinLnBrk="0" marL="2743200" rtl="0">
+      <a:lvl8pPr marL="3429000" indent="-228600" algn="l" defTabSz="457200" rtl="0" eaLnBrk="1" latinLnBrk="0" hangingPunct="1">
         <a:spcBef>
           <a:spcPct val="20000"/>
         </a:spcBef>
         <a:buFont typeface="Arial"/>
         <a:buChar char="•"/>
-        <a:defRPr kern="1200" sz="1500">
+        <a:defRPr sz="2000" kern="1200">
           <a:solidFill>
             <a:schemeClr val="tx1"/>
           </a:solidFill>
@@ -2966,13 +2986,13 @@
           <a:cs typeface="+mn-cs"/>
         </a:defRPr>
       </a:lvl8pPr>
-      <a:lvl9pPr algn="l" defTabSz="342900" eaLnBrk="1" hangingPunct="1" indent="-342900" latinLnBrk="0" marL="3086100" rtl="0">
+      <a:lvl9pPr marL="3886200" indent="-228600" algn="l" defTabSz="457200" rtl="0" eaLnBrk="1" latinLnBrk="0" hangingPunct="1">
         <a:spcBef>
           <a:spcPct val="20000"/>
         </a:spcBef>
         <a:buFont typeface="Arial"/>
         <a:buChar char="•"/>
-        <a:defRPr kern="1200" sz="1500">
+        <a:defRPr sz="2000" kern="1200">
           <a:solidFill>
             <a:schemeClr val="tx1"/>
           </a:solidFill>
@@ -2986,8 +3006,8 @@
       <a:defPPr>
         <a:defRPr lang="en-US"/>
       </a:defPPr>
-      <a:lvl1pPr algn="l" defTabSz="342900" eaLnBrk="1" hangingPunct="1" latinLnBrk="0" marL="0" rtl="0">
-        <a:defRPr kern="1200" sz="1350">
+      <a:lvl1pPr marL="0" algn="l" defTabSz="457200" rtl="0" eaLnBrk="1" latinLnBrk="0" hangingPunct="1">
+        <a:defRPr sz="1800" kern="1200">
           <a:solidFill>
             <a:schemeClr val="tx1"/>
           </a:solidFill>
@@ -2996,8 +3016,8 @@
           <a:cs typeface="+mn-cs"/>
         </a:defRPr>
       </a:lvl1pPr>
-      <a:lvl2pPr algn="l" defTabSz="342900" eaLnBrk="1" hangingPunct="1" latinLnBrk="0" marL="342900" rtl="0">
-        <a:defRPr kern="1200" sz="1350">
+      <a:lvl2pPr marL="457200" algn="l" defTabSz="457200" rtl="0" eaLnBrk="1" latinLnBrk="0" hangingPunct="1">
+        <a:defRPr sz="1800" kern="1200">
           <a:solidFill>
             <a:schemeClr val="tx1"/>
           </a:solidFill>
@@ -3006,8 +3026,8 @@
           <a:cs typeface="+mn-cs"/>
         </a:defRPr>
       </a:lvl2pPr>
-      <a:lvl3pPr algn="l" defTabSz="342900" eaLnBrk="1" hangingPunct="1" latinLnBrk="0" marL="685800" rtl="0">
-        <a:defRPr kern="1200" sz="1350">
+      <a:lvl3pPr marL="914400" algn="l" defTabSz="457200" rtl="0" eaLnBrk="1" latinLnBrk="0" hangingPunct="1">
+        <a:defRPr sz="1800" kern="1200">
           <a:solidFill>
             <a:schemeClr val="tx1"/>
           </a:solidFill>
@@ -3016,8 +3036,8 @@
           <a:cs typeface="+mn-cs"/>
         </a:defRPr>
       </a:lvl3pPr>
-      <a:lvl4pPr algn="l" defTabSz="342900" eaLnBrk="1" hangingPunct="1" latinLnBrk="0" marL="1028700" rtl="0">
-        <a:defRPr kern="1200" sz="1350">
+      <a:lvl4pPr marL="1371600" algn="l" defTabSz="457200" rtl="0" eaLnBrk="1" latinLnBrk="0" hangingPunct="1">
+        <a:defRPr sz="1800" kern="1200">
           <a:solidFill>
             <a:schemeClr val="tx1"/>
           </a:solidFill>
@@ -3026,8 +3046,8 @@
           <a:cs typeface="+mn-cs"/>
         </a:defRPr>
       </a:lvl4pPr>
-      <a:lvl5pPr algn="l" defTabSz="342900" eaLnBrk="1" hangingPunct="1" latinLnBrk="0" marL="1371600" rtl="0">
-        <a:defRPr kern="1200" sz="1350">
+      <a:lvl5pPr marL="1828800" algn="l" defTabSz="457200" rtl="0" eaLnBrk="1" latinLnBrk="0" hangingPunct="1">
+        <a:defRPr sz="1800" kern="1200">
           <a:solidFill>
             <a:schemeClr val="tx1"/>
           </a:solidFill>
@@ -3036,8 +3056,8 @@
           <a:cs typeface="+mn-cs"/>
         </a:defRPr>
       </a:lvl5pPr>
-      <a:lvl6pPr algn="l" defTabSz="342900" eaLnBrk="1" hangingPunct="1" latinLnBrk="0" marL="1714500" rtl="0">
-        <a:defRPr kern="1200" sz="1350">
+      <a:lvl6pPr marL="2286000" algn="l" defTabSz="457200" rtl="0" eaLnBrk="1" latinLnBrk="0" hangingPunct="1">
+        <a:defRPr sz="1800" kern="1200">
           <a:solidFill>
             <a:schemeClr val="tx1"/>
           </a:solidFill>
@@ -3046,8 +3066,8 @@
           <a:cs typeface="+mn-cs"/>
         </a:defRPr>
       </a:lvl6pPr>
-      <a:lvl7pPr algn="l" defTabSz="342900" eaLnBrk="1" hangingPunct="1" latinLnBrk="0" marL="2057400" rtl="0">
-        <a:defRPr kern="1200" sz="1350">
+      <a:lvl7pPr marL="2743200" algn="l" defTabSz="457200" rtl="0" eaLnBrk="1" latinLnBrk="0" hangingPunct="1">
+        <a:defRPr sz="1800" kern="1200">
           <a:solidFill>
             <a:schemeClr val="tx1"/>
           </a:solidFill>
@@ -3056,8 +3076,8 @@
           <a:cs typeface="+mn-cs"/>
         </a:defRPr>
       </a:lvl7pPr>
-      <a:lvl8pPr algn="l" defTabSz="342900" eaLnBrk="1" hangingPunct="1" latinLnBrk="0" marL="2400300" rtl="0">
-        <a:defRPr kern="1200" sz="1350">
+      <a:lvl8pPr marL="3200400" algn="l" defTabSz="457200" rtl="0" eaLnBrk="1" latinLnBrk="0" hangingPunct="1">
+        <a:defRPr sz="1800" kern="1200">
           <a:solidFill>
             <a:schemeClr val="tx1"/>
           </a:solidFill>
@@ -3066,8 +3086,8 @@
           <a:cs typeface="+mn-cs"/>
         </a:defRPr>
       </a:lvl8pPr>
-      <a:lvl9pPr algn="l" defTabSz="342900" eaLnBrk="1" hangingPunct="1" latinLnBrk="0" marL="2743200" rtl="0">
-        <a:defRPr kern="1200" sz="1350">
+      <a:lvl9pPr marL="3657600" algn="l" defTabSz="457200" rtl="0" eaLnBrk="1" latinLnBrk="0" hangingPunct="1">
+        <a:defRPr sz="1800" kern="1200">
           <a:solidFill>
             <a:schemeClr val="tx1"/>
           </a:solidFill>
@@ -3098,36 +3118,31 @@
           <a:chExt cx="0" cy="0"/>
         </a:xfrm>
       </p:grpSpPr>
-      <p:pic>
-        <p:nvPicPr>
-          <p:cNvPr descr="https://intecbrussel.be/img/logo3.png" id="0" name="Picture 1"/>
-          <p:cNvPicPr>
-            <a:picLocks noGrp="1" noChangeAspect="1"/>
-          </p:cNvPicPr>
-          <p:nvPr/>
-        </p:nvPicPr>
-        <p:blipFill>
-          <a:blip r:embed="rId2"/>
-          <a:stretch>
-            <a:fillRect/>
-          </a:stretch>
-        </p:blipFill>
-        <p:spPr bwMode="auto">
-          <a:xfrm>
-            <a:off x="457200" y="2070100"/>
-            <a:ext cx="8229600" cy="1625600"/>
-          </a:xfrm>
-          <a:prstGeom prst="rect">
-            <a:avLst/>
-          </a:prstGeom>
-          <a:noFill/>
-          <a:ln w="9525">
-            <a:noFill/>
-            <a:headEnd/>
-            <a:tailEnd/>
-          </a:ln>
-        </p:spPr>
-      </p:pic>
+      <p:sp>
+        <p:nvSpPr>
+          <p:cNvPr id="3" name="Content Placeholder 2"/>
+          <p:cNvSpPr>
+            <a:spLocks noGrp="1"/>
+          </p:cNvSpPr>
+          <p:nvPr>
+            <p:ph idx="1"/>
+          </p:nvPr>
+        </p:nvSpPr>
+        <p:spPr/>
+        <p:txBody>
+          <a:bodyPr/>
+          <a:lstStyle/>
+          <a:p>
+            <a:pPr lvl="0" marL="0" indent="0">
+              <a:buNone/>
+            </a:pPr>
+            <a:r>
+              <a:rPr/>
+              <a:t>  Python les-materialen  Yilmaz Mustafa, Instructeur Java/Python</a:t>
+            </a:r>
+          </a:p>
+        </p:txBody>
+      </p:sp>
     </p:spTree>
   </p:cSld>
 </p:sld>
@@ -3152,26 +3167,46 @@
       </p:grpSpPr>
       <p:sp>
         <p:nvSpPr>
-          <p:cNvPr id="3" name="Content Placeholder 2"/>
-          <p:cNvSpPr>
-            <a:spLocks noGrp="1"/>
-          </p:cNvSpPr>
-          <p:nvPr>
-            <p:ph idx="1"/>
-          </p:nvPr>
-        </p:nvSpPr>
-        <p:spPr/>
-        <p:txBody>
-          <a:bodyPr/>
-          <a:lstStyle/>
-          <a:p>
-            <a:pPr lvl="0" indent="0" marL="0">
+          <p:cNvPr id="2" name="Title 1"/>
+          <p:cNvSpPr>
+            <a:spLocks noGrp="1"/>
+          </p:cNvSpPr>
+          <p:nvPr>
+            <p:ph type="title"/>
+          </p:nvPr>
+        </p:nvSpPr>
+        <p:spPr>
+          <a:xfrm>
+            <a:off x="722313" y="4406900"/>
+            <a:ext cx="7772400" cy="1362075"/>
+          </a:xfrm>
+        </p:spPr>
+        <p:txBody>
+          <a:bodyPr/>
+          <a:lstStyle/>
+          <a:p>
+            <a:pPr lvl="0" marL="0" indent="0">
               <a:buNone/>
             </a:pPr>
-            <a:br/>
-            <a:r>
-              <a:rPr i="1"/>
-              <a:t>Python les-materialen</a:t>
+            <a:r>
+              <a:rPr/>
+              <a:t>Variabele</a:t>
+            </a:r>
+            <a:r>
+              <a:rPr/>
+              <a:t> </a:t>
+            </a:r>
+            <a:r>
+              <a:rPr/>
+              <a:t>Toewijzing</a:t>
+            </a:r>
+            <a:r>
+              <a:rPr/>
+              <a:t> </a:t>
+            </a:r>
+            <a:r>
+              <a:rPr/>
+              <a:t>(Assignments)</a:t>
             </a:r>
           </a:p>
         </p:txBody>
@@ -3208,22 +3243,198 @@
             <p:ph type="title"/>
           </p:nvPr>
         </p:nvSpPr>
-        <p:spPr>
-          <a:xfrm>
-            <a:off x="722313" y="3305176"/>
-            <a:ext cx="7772400" cy="1021556"/>
-          </a:xfrm>
-        </p:spPr>
-        <p:txBody>
-          <a:bodyPr/>
-          <a:lstStyle/>
-          <a:p>
-            <a:pPr lvl="0" indent="0" marL="0">
+        <p:spPr/>
+        <p:txBody>
+          <a:bodyPr/>
+          <a:lstStyle/>
+          <a:p>
+            <a:pPr lvl="0" marL="0" indent="0">
               <a:buNone/>
             </a:pPr>
             <a:r>
               <a:rPr/>
-              <a:t>Variabele Toewijzing (Assignments)</a:t>
+              <a:t>Regels</a:t>
+            </a:r>
+            <a:r>
+              <a:rPr/>
+              <a:t> </a:t>
+            </a:r>
+            <a:r>
+              <a:rPr/>
+              <a:t>voor</a:t>
+            </a:r>
+            <a:r>
+              <a:rPr/>
+              <a:t> </a:t>
+            </a:r>
+            <a:r>
+              <a:rPr/>
+              <a:t>namen</a:t>
+            </a:r>
+            <a:r>
+              <a:rPr/>
+              <a:t> </a:t>
+            </a:r>
+            <a:r>
+              <a:rPr/>
+              <a:t>van</a:t>
+            </a:r>
+            <a:r>
+              <a:rPr/>
+              <a:t> </a:t>
+            </a:r>
+            <a:r>
+              <a:rPr/>
+              <a:t>variabelen</a:t>
+            </a:r>
+            <a:r>
+              <a:rPr/>
+              <a:t> </a:t>
+            </a:r>
+            <a:r>
+              <a:rPr/>
+              <a:t>(Naamgevingsconventies)</a:t>
+            </a:r>
+          </a:p>
+        </p:txBody>
+      </p:sp>
+      <p:sp>
+        <p:nvSpPr>
+          <p:cNvPr id="3" name="Content Placeholder 2"/>
+          <p:cNvSpPr>
+            <a:spLocks noGrp="1"/>
+          </p:cNvSpPr>
+          <p:nvPr>
+            <p:ph idx="1"/>
+          </p:nvPr>
+        </p:nvSpPr>
+        <p:spPr/>
+        <p:txBody>
+          <a:bodyPr/>
+          <a:lstStyle/>
+          <a:p>
+            <a:pPr lvl="1"/>
+            <a:r>
+              <a:rPr/>
+              <a:t>namen mogen niet beginnen met een cijfer</a:t>
+            </a:r>
+          </a:p>
+          <a:p>
+            <a:pPr lvl="1"/>
+            <a:r>
+              <a:rPr/>
+              <a:t>namen mogen geen spaties bevatten, gebruik _ intead</a:t>
+            </a:r>
+          </a:p>
+          <a:p>
+            <a:pPr lvl="1"/>
+            <a:r>
+              <a:rPr/>
+              <a:t>namen mogen geen van deze symbolen bevatten:</a:t>
+            </a:r>
+          </a:p>
+          <a:p>
+            <a:pPr lvl="1" indent="0">
+              <a:buNone/>
+            </a:pPr>
+            <a:r>
+              <a:rPr>
+                <a:latin typeface="Courier"/>
+              </a:rPr>
+              <a:t> :'",&lt;&gt;/?|\!@#%^&amp;*~-+</a:t>
+            </a:r>
+          </a:p>
+          <a:p>
+            <a:pPr lvl="1"/>
+            <a:r>
+              <a:rPr/>
+              <a:t>het wordt als de beste praktijk beschouwd (</a:t>
+            </a:r>
+            <a:r>
+              <a:rPr>
+                <a:hlinkClick r:id="rId2"/>
+              </a:rPr>
+              <a:t>PEP8</a:t>
+            </a:r>
+            <a:r>
+              <a:rPr/>
+              <a:t>) dat namen in kleine letters met underscores zijn</a:t>
+            </a:r>
+          </a:p>
+          <a:p>
+            <a:pPr lvl="1"/>
+            <a:r>
+              <a:rPr/>
+              <a:t>vermijd het gebruik van ingebouwde Python-sleutelwoorden zoals </a:t>
+            </a:r>
+            <a:r>
+              <a:rPr>
+                <a:latin typeface="Courier"/>
+              </a:rPr>
+              <a:t>list</a:t>
+            </a:r>
+            <a:r>
+              <a:rPr/>
+              <a:t> en </a:t>
+            </a:r>
+            <a:r>
+              <a:rPr>
+                <a:latin typeface="Courier"/>
+              </a:rPr>
+              <a:t>str</a:t>
+            </a:r>
+          </a:p>
+          <a:p>
+            <a:pPr lvl="1"/>
+            <a:r>
+              <a:rPr/>
+              <a:t>vermijd het gebruik van de enkele karakters </a:t>
+            </a:r>
+            <a:r>
+              <a:rPr>
+                <a:latin typeface="Courier"/>
+              </a:rPr>
+              <a:t>l</a:t>
+            </a:r>
+            <a:r>
+              <a:rPr/>
+              <a:t> (kleine letter l), </a:t>
+            </a:r>
+            <a:r>
+              <a:rPr>
+                <a:latin typeface="Courier"/>
+              </a:rPr>
+              <a:t>O</a:t>
+            </a:r>
+            <a:r>
+              <a:rPr/>
+              <a:t> (hoofdletter o) en </a:t>
+            </a:r>
+            <a:r>
+              <a:rPr>
+                <a:latin typeface="Courier"/>
+              </a:rPr>
+              <a:t>I</a:t>
+            </a:r>
+            <a:r>
+              <a:rPr/>
+              <a:t> (hoofdletter i), aangezien deze kunnen worden verward met </a:t>
+            </a:r>
+            <a:r>
+              <a:rPr>
+                <a:latin typeface="Courier"/>
+              </a:rPr>
+              <a:t>1</a:t>
+            </a:r>
+            <a:r>
+              <a:rPr/>
+              <a:t> en </a:t>
+            </a:r>
+            <a:r>
+              <a:rPr>
+                <a:latin typeface="Courier"/>
+              </a:rPr>
+              <a:t>0</a:t>
             </a:r>
           </a:p>
         </p:txBody>
@@ -3265,12 +3476,20 @@
           <a:bodyPr/>
           <a:lstStyle/>
           <a:p>
-            <a:pPr lvl="0" indent="0" marL="0">
+            <a:pPr lvl="0" marL="0" indent="0">
               <a:buNone/>
             </a:pPr>
             <a:r>
               <a:rPr/>
-              <a:t>Regels voor namen van variabelen (Naamgevingsconventies)</a:t>
+              <a:t>Dynamisch</a:t>
+            </a:r>
+            <a:r>
+              <a:rPr/>
+              <a:t> </a:t>
+            </a:r>
+            <a:r>
+              <a:rPr/>
+              <a:t>typen</a:t>
             </a:r>
           </a:p>
         </p:txBody>
@@ -3290,128 +3509,233 @@
           <a:bodyPr/>
           <a:lstStyle/>
           <a:p>
-            <a:pPr lvl="0"/>
-            <a:r>
-              <a:rPr/>
-              <a:t>namen mogen niet beginnen met een cijfer</a:t>
-            </a:r>
-          </a:p>
-          <a:p>
-            <a:pPr lvl="0"/>
-            <a:r>
-              <a:rPr/>
-              <a:t>namen mogen geen spaties bevatten, gebruik _ intead</a:t>
-            </a:r>
-          </a:p>
-          <a:p>
-            <a:pPr lvl="0"/>
-            <a:r>
-              <a:rPr/>
-              <a:t>namen mogen geen van deze symbolen bevatten:</a:t>
-            </a:r>
-          </a:p>
-          <a:p>
-            <a:pPr lvl="1" indent="0">
+            <a:pPr lvl="0" marL="0" indent="0">
               <a:buNone/>
             </a:pPr>
             <a:r>
-              <a:rPr>
-                <a:latin typeface="Courier"/>
-              </a:rPr>
-              <a:t> :'",&lt;&gt;/?|\!@#%^&amp;*~-+</a:t>
-            </a:r>
-          </a:p>
-          <a:p>
-            <a:pPr lvl="0"/>
-            <a:r>
-              <a:rPr/>
-              <a:t>het wordt als de beste praktijk beschouwd (</a:t>
-            </a:r>
-            <a:r>
-              <a:rPr>
-                <a:hlinkClick r:id="rId2"/>
-              </a:rPr>
-              <a:t>PEP8</a:t>
-            </a:r>
-            <a:r>
-              <a:rPr/>
-              <a:t>) dat namen in kleine letters met underscores zijn</a:t>
-            </a:r>
-          </a:p>
-          <a:p>
-            <a:pPr lvl="0"/>
-            <a:r>
-              <a:rPr/>
-              <a:t>vermijd het gebruik van ingebouwde Python-sleutelwoorden zoals </a:t>
-            </a:r>
-            <a:r>
-              <a:rPr>
-                <a:latin typeface="Courier"/>
-              </a:rPr>
-              <a:t>list</a:t>
-            </a:r>
-            <a:r>
-              <a:rPr/>
-              <a:t> en </a:t>
-            </a:r>
-            <a:r>
-              <a:rPr>
-                <a:latin typeface="Courier"/>
-              </a:rPr>
-              <a:t>str</a:t>
-            </a:r>
-          </a:p>
-          <a:p>
-            <a:pPr lvl="0"/>
-            <a:r>
-              <a:rPr/>
-              <a:t>vermijd het gebruik van de enkele karakters </a:t>
-            </a:r>
-            <a:r>
-              <a:rPr>
-                <a:latin typeface="Courier"/>
-              </a:rPr>
-              <a:t>l</a:t>
-            </a:r>
-            <a:r>
-              <a:rPr/>
-              <a:t> (kleine letter l), </a:t>
-            </a:r>
-            <a:r>
-              <a:rPr>
-                <a:latin typeface="Courier"/>
-              </a:rPr>
-              <a:t>O</a:t>
-            </a:r>
-            <a:r>
-              <a:rPr/>
-              <a:t> (hoofdletter o) en </a:t>
-            </a:r>
-            <a:r>
-              <a:rPr>
-                <a:latin typeface="Courier"/>
-              </a:rPr>
-              <a:t>I</a:t>
-            </a:r>
-            <a:r>
-              <a:rPr/>
-              <a:t> (hoofdletter i), aangezien deze kunnen worden verward met </a:t>
-            </a:r>
-            <a:r>
-              <a:rPr>
-                <a:latin typeface="Courier"/>
-              </a:rPr>
-              <a:t>1</a:t>
-            </a:r>
-            <a:r>
-              <a:rPr/>
-              <a:t> en </a:t>
-            </a:r>
-            <a:r>
-              <a:rPr>
-                <a:latin typeface="Courier"/>
-              </a:rPr>
-              <a:t>0</a:t>
+              <a:rPr/>
+              <a:t>Python gebruikt </a:t>
+            </a:r>
+            <a:r>
+              <a:rPr i="1"/>
+              <a:t>dynamisch typen</a:t>
+            </a:r>
+            <a:r>
+              <a:rPr/>
+              <a:t>, wat betekent dat je variabelen opnieuw kunt toewijzen aan verschillende gegevenstypen. Dit maakt Python erg flexibel in het toewijzen van datatypes; het verschilt van andere talen die </a:t>
+            </a:r>
+            <a:r>
+              <a:rPr i="1"/>
+              <a:t>statisch getypt</a:t>
+            </a:r>
+            <a:r>
+              <a:rPr/>
+              <a:t> zijn.</a:t>
+            </a:r>
+          </a:p>
+          <a:p>
+            <a:pPr lvl="0" indent="0">
+              <a:buNone/>
+            </a:pPr>
+            <a:r>
+              <a:rPr>
+                <a:latin typeface="Courier"/>
+              </a:rPr>
+              <a:t>my_dogs </a:t>
+            </a:r>
+            <a:r>
+              <a:rPr>
+                <a:solidFill>
+                  <a:srgbClr val="666666"/>
+                </a:solidFill>
+                <a:latin typeface="Courier"/>
+              </a:rPr>
+              <a:t>=</a:t>
+            </a:r>
+            <a:r>
+              <a:rPr>
+                <a:latin typeface="Courier"/>
+              </a:rPr>
+              <a:t> </a:t>
+            </a:r>
+            <a:r>
+              <a:rPr>
+                <a:solidFill>
+                  <a:srgbClr val="40A070"/>
+                </a:solidFill>
+                <a:latin typeface="Courier"/>
+              </a:rPr>
+              <a:t>2</a:t>
+            </a:r>
+          </a:p>
+          <a:p>
+            <a:pPr lvl="0" indent="0">
+              <a:buNone/>
+            </a:pPr>
+            <a:r>
+              <a:rPr>
+                <a:latin typeface="Courier"/>
+              </a:rPr>
+              <a:t>my_dogs</a:t>
+            </a:r>
+          </a:p>
+          <a:p>
+            <a:pPr lvl="0" indent="0">
+              <a:buNone/>
+            </a:pPr>
+            <a:r>
+              <a:rPr>
+                <a:latin typeface="Courier"/>
+              </a:rPr>
+              <a:t>2</a:t>
+            </a:r>
+          </a:p>
+          <a:p>
+            <a:pPr lvl="0" indent="0">
+              <a:buNone/>
+            </a:pPr>
+            <a:r>
+              <a:rPr>
+                <a:latin typeface="Courier"/>
+              </a:rPr>
+              <a:t>my_dogs </a:t>
+            </a:r>
+            <a:r>
+              <a:rPr>
+                <a:solidFill>
+                  <a:srgbClr val="666666"/>
+                </a:solidFill>
+                <a:latin typeface="Courier"/>
+              </a:rPr>
+              <a:t>=</a:t>
+            </a:r>
+            <a:r>
+              <a:rPr>
+                <a:latin typeface="Courier"/>
+              </a:rPr>
+              <a:t> [</a:t>
+            </a:r>
+            <a:r>
+              <a:rPr>
+                <a:solidFill>
+                  <a:srgbClr val="4070A0"/>
+                </a:solidFill>
+                <a:latin typeface="Courier"/>
+              </a:rPr>
+              <a:t>'Sammy'</a:t>
+            </a:r>
+            <a:r>
+              <a:rPr>
+                <a:latin typeface="Courier"/>
+              </a:rPr>
+              <a:t>, </a:t>
+            </a:r>
+            <a:r>
+              <a:rPr>
+                <a:solidFill>
+                  <a:srgbClr val="4070A0"/>
+                </a:solidFill>
+                <a:latin typeface="Courier"/>
+              </a:rPr>
+              <a:t>'Frankie'</a:t>
+            </a:r>
+            <a:r>
+              <a:rPr>
+                <a:latin typeface="Courier"/>
+              </a:rPr>
+              <a:t>]</a:t>
+            </a:r>
+          </a:p>
+          <a:p>
+            <a:pPr lvl="0" indent="0">
+              <a:buNone/>
+            </a:pPr>
+            <a:r>
+              <a:rPr>
+                <a:latin typeface="Courier"/>
+              </a:rPr>
+              <a:t>my_dogs</a:t>
+            </a:r>
+          </a:p>
+          <a:p>
+            <a:pPr lvl="0" indent="0">
+              <a:buNone/>
+            </a:pPr>
+            <a:r>
+              <a:rPr>
+                <a:latin typeface="Courier"/>
+              </a:rPr>
+              <a:t>['Sammy', 'Frankie']</a:t>
+            </a:r>
+          </a:p>
+          <a:p>
+            <a:pPr lvl="0" marL="0" indent="0">
+              <a:spcBef>
+                <a:spcPts val="3000"/>
+              </a:spcBef>
+              <a:buNone/>
+            </a:pPr>
+            <a:r>
+              <a:rPr b="1"/>
+              <a:t>Voor- en nadelen van dynamisch typen</a:t>
+            </a:r>
+          </a:p>
+          <a:p>
+            <a:pPr lvl="0" marL="0" indent="0">
+              <a:spcBef>
+                <a:spcPts val="3000"/>
+              </a:spcBef>
+              <a:buNone/>
+            </a:pPr>
+            <a:r>
+              <a:rPr b="1"/>
+              <a:t>Voordelen van dynamisch typen</a:t>
+            </a:r>
+          </a:p>
+          <a:p>
+            <a:pPr lvl="1"/>
+            <a:r>
+              <a:rPr/>
+              <a:t>zeer gemakkelijk om mee te werken</a:t>
+            </a:r>
+          </a:p>
+          <a:p>
+            <a:pPr lvl="1"/>
+            <a:r>
+              <a:rPr/>
+              <a:t>snellere ontwikkeltijd</a:t>
+            </a:r>
+          </a:p>
+          <a:p>
+            <a:pPr lvl="0" marL="0" indent="0">
+              <a:spcBef>
+                <a:spcPts val="3000"/>
+              </a:spcBef>
+              <a:buNone/>
+            </a:pPr>
+            <a:r>
+              <a:rPr b="1"/>
+              <a:t>Nadelen van dynamisch typen</a:t>
+            </a:r>
+          </a:p>
+          <a:p>
+            <a:pPr lvl="1"/>
+            <a:r>
+              <a:rPr/>
+              <a:t>kan leiden tot onverwachte bugs!</a:t>
+            </a:r>
+          </a:p>
+          <a:p>
+            <a:pPr lvl="1"/>
+            <a:r>
+              <a:rPr/>
+              <a:t>je moet op de hoogte zijn van </a:t>
+            </a:r>
+            <a:r>
+              <a:rPr>
+                <a:latin typeface="Courier"/>
+              </a:rPr>
+              <a:t>type()</a:t>
             </a:r>
           </a:p>
         </p:txBody>
@@ -3453,12 +3777,20 @@
           <a:bodyPr/>
           <a:lstStyle/>
           <a:p>
-            <a:pPr lvl="0" indent="0" marL="0">
+            <a:pPr lvl="0" marL="0" indent="0">
               <a:buNone/>
             </a:pPr>
             <a:r>
               <a:rPr/>
-              <a:t>Dynamisch typen</a:t>
+              <a:t>Variabelen</a:t>
+            </a:r>
+            <a:r>
+              <a:rPr/>
+              <a:t> </a:t>
+            </a:r>
+            <a:r>
+              <a:rPr/>
+              <a:t>toewijzen</a:t>
             </a:r>
           </a:p>
         </p:txBody>
@@ -3478,28 +3810,40 @@
           <a:bodyPr/>
           <a:lstStyle/>
           <a:p>
-            <a:pPr lvl="0" indent="0" marL="0">
+            <a:pPr lvl="0" marL="0" indent="0">
               <a:buNone/>
             </a:pPr>
             <a:r>
               <a:rPr/>
-              <a:t>Python gebruikt </a:t>
+              <a:t>Variabele toewijzing volgt </a:t>
+            </a:r>
+            <a:r>
+              <a:rPr>
+                <a:latin typeface="Courier"/>
+              </a:rPr>
+              <a:t>naam = object</a:t>
+            </a:r>
+            <a:r>
+              <a:rPr/>
+              <a:t>, waarbij een enkel gelijkteken </a:t>
+            </a:r>
+            <a:r>
+              <a:rPr>
+                <a:latin typeface="Courier"/>
+              </a:rPr>
+              <a:t>=</a:t>
+            </a:r>
+            <a:r>
+              <a:rPr/>
+              <a:t> een </a:t>
             </a:r>
             <a:r>
               <a:rPr i="1"/>
-              <a:t>dynamisch typen</a:t>
-            </a:r>
-            <a:r>
-              <a:rPr/>
-              <a:t>, wat betekent dat je variabelen opnieuw kunt toewijzen aan verschillende gegevenstypen. Dit maakt Python erg flexibel in het toewijzen van datatypes; het verschilt van andere talen die </a:t>
-            </a:r>
-            <a:r>
-              <a:rPr i="1"/>
-              <a:t>statisch getypt</a:t>
-            </a:r>
-            <a:r>
-              <a:rPr/>
-              <a:t> zijn.</a:t>
+              <a:t>toewijzingsoperator</a:t>
+            </a:r>
+            <a:r>
+              <a:rPr/>
+              <a:t> is</a:t>
             </a:r>
           </a:p>
           <a:p>
@@ -3510,7 +3854,7 @@
               <a:rPr>
                 <a:latin typeface="Courier"/>
               </a:rPr>
-              <a:t>my_dogs </a:t>
+              <a:t>a </a:t>
             </a:r>
             <a:r>
               <a:rPr>
@@ -3534,7 +3878,7 @@
                 </a:solidFill>
                 <a:latin typeface="Courier"/>
               </a:rPr>
-              <a:t>2</a:t>
+              <a:t>5</a:t>
             </a:r>
           </a:p>
           <a:p>
@@ -3545,7 +3889,7 @@
               <a:rPr>
                 <a:latin typeface="Courier"/>
               </a:rPr>
-              <a:t>my_dogs</a:t>
+              <a:t>a</a:t>
             </a:r>
           </a:p>
           <a:p>
@@ -3556,7 +3900,46 @@
               <a:rPr>
                 <a:latin typeface="Courier"/>
               </a:rPr>
-              <a:t>2</a:t>
+              <a:t>5</a:t>
+            </a:r>
+          </a:p>
+          <a:p>
+            <a:pPr lvl="0" marL="0" indent="0">
+              <a:buNone/>
+            </a:pPr>
+            <a:r>
+              <a:rPr/>
+              <a:t>Hier hebben we het integer-object </a:t>
+            </a:r>
+            <a:r>
+              <a:rPr>
+                <a:latin typeface="Courier"/>
+              </a:rPr>
+              <a:t>5</a:t>
+            </a:r>
+            <a:r>
+              <a:rPr/>
+              <a:t> toegewezen aan de variabelenaam </a:t>
+            </a:r>
+            <a:r>
+              <a:rPr>
+                <a:latin typeface="Courier"/>
+              </a:rPr>
+              <a:t>a</a:t>
+            </a:r>
+            <a:r>
+              <a:rPr/>
+              <a:t>.Laten we </a:t>
+            </a:r>
+            <a:r>
+              <a:rPr>
+                <a:latin typeface="Courier"/>
+              </a:rPr>
+              <a:t>a</a:t>
+            </a:r>
+            <a:r>
+              <a:rPr/>
+              <a:t> aan iets anders toewijzen:</a:t>
             </a:r>
           </a:p>
           <a:p>
@@ -3567,7 +3950,7 @@
               <a:rPr>
                 <a:latin typeface="Courier"/>
               </a:rPr>
-              <a:t>my_dogs </a:t>
+              <a:t>a </a:t>
             </a:r>
             <a:r>
               <a:rPr>
@@ -3582,37 +3965,93 @@
               <a:rPr>
                 <a:latin typeface="Courier"/>
               </a:rPr>
-              <a:t> [</a:t>
+              <a:t> </a:t>
             </a:r>
             <a:r>
               <a:rPr>
                 <a:solidFill>
-                  <a:srgbClr val="4070A0"/>
+                  <a:srgbClr val="40A070"/>
                 </a:solidFill>
                 <a:latin typeface="Courier"/>
               </a:rPr>
-              <a:t>'Sammy'</a:t>
-            </a:r>
-            <a:r>
-              <a:rPr>
-                <a:latin typeface="Courier"/>
-              </a:rPr>
-              <a:t>, </a:t>
+              <a:t>10</a:t>
+            </a:r>
+          </a:p>
+          <a:p>
+            <a:pPr lvl="0" indent="0">
+              <a:buNone/>
+            </a:pPr>
+            <a:r>
+              <a:rPr>
+                <a:latin typeface="Courier"/>
+              </a:rPr>
+              <a:t>a</a:t>
+            </a:r>
+          </a:p>
+          <a:p>
+            <a:pPr lvl="0" indent="0">
+              <a:buNone/>
+            </a:pPr>
+            <a:r>
+              <a:rPr>
+                <a:latin typeface="Courier"/>
+              </a:rPr>
+              <a:t>10</a:t>
+            </a:r>
+          </a:p>
+          <a:p>
+            <a:pPr lvl="0" marL="0" indent="0">
+              <a:buNone/>
+            </a:pPr>
+            <a:r>
+              <a:rPr/>
+              <a:t>U kunt nu </a:t>
+            </a:r>
+            <a:r>
+              <a:rPr>
+                <a:latin typeface="Courier"/>
+              </a:rPr>
+              <a:t>a</a:t>
+            </a:r>
+            <a:r>
+              <a:rPr/>
+              <a:t> gebruiken in plaats van het getal </a:t>
+            </a:r>
+            <a:r>
+              <a:rPr>
+                <a:latin typeface="Courier"/>
+              </a:rPr>
+              <a:t>10</a:t>
+            </a:r>
+            <a:r>
+              <a:rPr/>
+              <a:t>:</a:t>
+            </a:r>
+          </a:p>
+          <a:p>
+            <a:pPr lvl="0" indent="0">
+              <a:buNone/>
+            </a:pPr>
+            <a:r>
+              <a:rPr>
+                <a:latin typeface="Courier"/>
+              </a:rPr>
+              <a:t>a </a:t>
             </a:r>
             <a:r>
               <a:rPr>
                 <a:solidFill>
-                  <a:srgbClr val="4070A0"/>
+                  <a:srgbClr val="666666"/>
                 </a:solidFill>
                 <a:latin typeface="Courier"/>
               </a:rPr>
-              <a:t>'Frankie'</a:t>
-            </a:r>
-            <a:r>
-              <a:rPr>
-                <a:latin typeface="Courier"/>
-              </a:rPr>
-              <a:t>]</a:t>
+              <a:t>+</a:t>
+            </a:r>
+            <a:r>
+              <a:rPr>
+                <a:latin typeface="Courier"/>
+              </a:rPr>
+              <a:t> a</a:t>
             </a:r>
           </a:p>
           <a:p>
@@ -3623,88 +4062,7 @@
               <a:rPr>
                 <a:latin typeface="Courier"/>
               </a:rPr>
-              <a:t>my_dogs</a:t>
-            </a:r>
-          </a:p>
-          <a:p>
-            <a:pPr lvl="0" indent="0">
-              <a:buNone/>
-            </a:pPr>
-            <a:r>
-              <a:rPr>
-                <a:latin typeface="Courier"/>
-              </a:rPr>
-              <a:t>['Sammy', 'Frankie']</a:t>
-            </a:r>
-          </a:p>
-          <a:p>
-            <a:pPr lvl="0" indent="0" marL="0">
-              <a:spcBef>
-                <a:spcPts val="3000"/>
-              </a:spcBef>
-              <a:buNone/>
-            </a:pPr>
-            <a:r>
-              <a:rPr b="1"/>
-              <a:t>Voor- en nadelen van dynamisch typen</a:t>
-            </a:r>
-          </a:p>
-          <a:p>
-            <a:pPr lvl="0" indent="0" marL="0">
-              <a:spcBef>
-                <a:spcPts val="3000"/>
-              </a:spcBef>
-              <a:buNone/>
-            </a:pPr>
-            <a:r>
-              <a:rPr b="1"/>
-              <a:t>Voordelen van dynamisch typen</a:t>
-            </a:r>
-          </a:p>
-          <a:p>
-            <a:pPr lvl="0"/>
-            <a:r>
-              <a:rPr/>
-              <a:t>zeer gemakkelijk om mee te werken</a:t>
-            </a:r>
-          </a:p>
-          <a:p>
-            <a:pPr lvl="0"/>
-            <a:r>
-              <a:rPr/>
-              <a:t>snellere ontwikkeltijd</a:t>
-            </a:r>
-          </a:p>
-          <a:p>
-            <a:pPr lvl="0" indent="0" marL="0">
-              <a:spcBef>
-                <a:spcPts val="3000"/>
-              </a:spcBef>
-              <a:buNone/>
-            </a:pPr>
-            <a:r>
-              <a:rPr b="1"/>
-              <a:t>Nadelen van dynamisch typen</a:t>
-            </a:r>
-          </a:p>
-          <a:p>
-            <a:pPr lvl="0"/>
-            <a:r>
-              <a:rPr/>
-              <a:t>kan leiden tot onverwachte bugs!</a:t>
-            </a:r>
-          </a:p>
-          <a:p>
-            <a:pPr lvl="0"/>
-            <a:r>
-              <a:rPr/>
-              <a:t>je moet op de hoogte zijn van </a:t>
-            </a:r>
-            <a:r>
-              <a:rPr>
-                <a:latin typeface="Courier"/>
-              </a:rPr>
-              <a:t>type()</a:t>
+              <a:t>20</a:t>
             </a:r>
           </a:p>
         </p:txBody>
@@ -3746,12 +4104,28 @@
           <a:bodyPr/>
           <a:lstStyle/>
           <a:p>
-            <a:pPr lvl="0" indent="0" marL="0">
+            <a:pPr lvl="0" marL="0" indent="0">
               <a:buNone/>
             </a:pPr>
             <a:r>
               <a:rPr/>
-              <a:t>Variabelen toewijzen</a:t>
+              <a:t>Variabelen</a:t>
+            </a:r>
+            <a:r>
+              <a:rPr/>
+              <a:t> </a:t>
+            </a:r>
+            <a:r>
+              <a:rPr/>
+              <a:t>opnieuw</a:t>
+            </a:r>
+            <a:r>
+              <a:rPr/>
+              <a:t> </a:t>
+            </a:r>
+            <a:r>
+              <a:rPr/>
+              <a:t>toewijzen</a:t>
             </a:r>
           </a:p>
         </p:txBody>
@@ -3771,40 +4145,12 @@
           <a:bodyPr/>
           <a:lstStyle/>
           <a:p>
-            <a:pPr lvl="0" indent="0" marL="0">
+            <a:pPr lvl="0" marL="0" indent="0">
               <a:buNone/>
             </a:pPr>
             <a:r>
               <a:rPr/>
-              <a:t>Variabele toewijzing volgt </a:t>
-            </a:r>
-            <a:r>
-              <a:rPr>
-                <a:latin typeface="Courier"/>
-              </a:rPr>
-              <a:t>naam = object</a:t>
-            </a:r>
-            <a:r>
-              <a:rPr/>
-              <a:t>, waarbij een enkel gelijkteken </a:t>
-            </a:r>
-            <a:r>
-              <a:rPr>
-                <a:latin typeface="Courier"/>
-              </a:rPr>
-              <a:t>=</a:t>
-            </a:r>
-            <a:r>
-              <a:rPr/>
-              <a:t> een </a:t>
-            </a:r>
-            <a:r>
-              <a:rPr i="1"/>
-              <a:t>toewijzingsoperator</a:t>
-            </a:r>
-            <a:r>
-              <a:rPr/>
-              <a:t> is</a:t>
+              <a:t>Met Python kun je variabelen opnieuw toewijzen met een verwijzing naar hetzelfde object.</a:t>
             </a:r>
           </a:p>
           <a:p>
@@ -3830,6 +4176,21 @@
               <a:rPr>
                 <a:latin typeface="Courier"/>
               </a:rPr>
+              <a:t> a </a:t>
+            </a:r>
+            <a:r>
+              <a:rPr>
+                <a:solidFill>
+                  <a:srgbClr val="666666"/>
+                </a:solidFill>
+                <a:latin typeface="Courier"/>
+              </a:rPr>
+              <a:t>+</a:t>
+            </a:r>
+            <a:r>
+              <a:rPr>
+                <a:latin typeface="Courier"/>
+              </a:rPr>
               <a:t> </a:t>
             </a:r>
             <a:r>
@@ -3839,7 +4200,7 @@
                 </a:solidFill>
                 <a:latin typeface="Courier"/>
               </a:rPr>
-              <a:t>5</a:t>
+              <a:t>10</a:t>
             </a:r>
           </a:p>
           <a:p>
@@ -3861,46 +4222,56 @@
               <a:rPr>
                 <a:latin typeface="Courier"/>
               </a:rPr>
-              <a:t>5</a:t>
-            </a:r>
-          </a:p>
-          <a:p>
-            <a:pPr lvl="0" indent="0" marL="0">
+              <a:t>20</a:t>
+            </a:r>
+          </a:p>
+          <a:p>
+            <a:pPr lvl="0" marL="0" indent="0">
               <a:buNone/>
             </a:pPr>
             <a:r>
               <a:rPr/>
-              <a:t>Hier hebben we het integer-object </a:t>
-            </a:r>
-            <a:r>
-              <a:rPr>
-                <a:latin typeface="Courier"/>
-              </a:rPr>
-              <a:t>5</a:t>
-            </a:r>
-            <a:r>
-              <a:rPr/>
-              <a:t> toegewezen aan de variabelenaam </a:t>
-            </a:r>
-            <a:r>
-              <a:rPr>
-                <a:latin typeface="Courier"/>
-              </a:rPr>
-              <a:t>a</a:t>
-            </a:r>
-            <a:r>
-              <a:rPr/>
-              <a:t>.Laten we </a:t>
-            </a:r>
-            <a:r>
-              <a:rPr>
-                <a:latin typeface="Courier"/>
-              </a:rPr>
-              <a:t>a</a:t>
-            </a:r>
-            <a:r>
-              <a:rPr/>
-              <a:t> aan iets anders toewijzen:</a:t>
+              <a:t>Hier is een snelkoppeling voor. Met Python kun je getallen optellen, aftrekken, vermenigvuldigen en delen door ze opnieuw toe te wijzen met behulp van </a:t>
+            </a:r>
+            <a:r>
+              <a:rPr>
+                <a:latin typeface="Courier"/>
+              </a:rPr>
+              <a:t>+=</a:t>
+            </a:r>
+            <a:r>
+              <a:rPr/>
+              <a:t>, </a:t>
+            </a:r>
+            <a:r>
+              <a:rPr>
+                <a:latin typeface="Courier"/>
+              </a:rPr>
+              <a:t>-=</a:t>
+            </a:r>
+            <a:r>
+              <a:rPr/>
+              <a:t>, </a:t>
+            </a:r>
+            <a:r>
+              <a:rPr>
+                <a:latin typeface="Courier"/>
+              </a:rPr>
+              <a:t>*=</a:t>
+            </a:r>
+            <a:r>
+              <a:rPr/>
+              <a:t> en </a:t>
+            </a:r>
+            <a:r>
+              <a:rPr>
+                <a:latin typeface="Courier"/>
+              </a:rPr>
+              <a:t>/=</a:t>
+            </a:r>
+            <a:r>
+              <a:rPr/>
+              <a:t>.</a:t>
             </a:r>
           </a:p>
           <a:p>
@@ -3920,7 +4291,7 @@
                 </a:solidFill>
                 <a:latin typeface="Courier"/>
               </a:rPr>
-              <a:t>=</a:t>
+              <a:t>+=</a:t>
             </a:r>
             <a:r>
               <a:rPr>
@@ -3957,36 +4328,7 @@
               <a:rPr>
                 <a:latin typeface="Courier"/>
               </a:rPr>
-              <a:t>10</a:t>
-            </a:r>
-          </a:p>
-          <a:p>
-            <a:pPr lvl="0" indent="0" marL="0">
-              <a:buNone/>
-            </a:pPr>
-            <a:r>
-              <a:rPr/>
-              <a:t>U kunt nu </a:t>
-            </a:r>
-            <a:r>
-              <a:rPr>
-                <a:latin typeface="Courier"/>
-              </a:rPr>
-              <a:t>a</a:t>
-            </a:r>
-            <a:r>
-              <a:rPr/>
-              <a:t> gebruiken in plaats van het getal </a:t>
-            </a:r>
-            <a:r>
-              <a:rPr>
-                <a:latin typeface="Courier"/>
-              </a:rPr>
-              <a:t>10</a:t>
-            </a:r>
-            <a:r>
-              <a:rPr/>
-              <a:t>:</a:t>
+              <a:t>30</a:t>
             </a:r>
           </a:p>
           <a:p>
@@ -4006,13 +4348,22 @@
                 </a:solidFill>
                 <a:latin typeface="Courier"/>
               </a:rPr>
-              <a:t>+</a:t>
-            </a:r>
-            <a:r>
-              <a:rPr>
-                <a:latin typeface="Courier"/>
-              </a:rPr>
-              <a:t> a</a:t>
+              <a:t>*=</a:t>
+            </a:r>
+            <a:r>
+              <a:rPr>
+                <a:latin typeface="Courier"/>
+              </a:rPr>
+              <a:t> </a:t>
+            </a:r>
+            <a:r>
+              <a:rPr>
+                <a:solidFill>
+                  <a:srgbClr val="40A070"/>
+                </a:solidFill>
+                <a:latin typeface="Courier"/>
+              </a:rPr>
+              <a:t>2</a:t>
             </a:r>
           </a:p>
           <a:p>
@@ -4023,7 +4374,18 @@
               <a:rPr>
                 <a:latin typeface="Courier"/>
               </a:rPr>
-              <a:t>20</a:t>
+              <a:t>a</a:t>
+            </a:r>
+          </a:p>
+          <a:p>
+            <a:pPr lvl="0" indent="0">
+              <a:buNone/>
+            </a:pPr>
+            <a:r>
+              <a:rPr>
+                <a:latin typeface="Courier"/>
+              </a:rPr>
+              <a:t>60</a:t>
             </a:r>
           </a:p>
         </p:txBody>
@@ -4065,12 +4427,46 @@
           <a:bodyPr/>
           <a:lstStyle/>
           <a:p>
-            <a:pPr lvl="0" indent="0" marL="0">
+            <a:pPr lvl="0" marL="0" indent="0">
               <a:buNone/>
             </a:pPr>
             <a:r>
               <a:rPr/>
-              <a:t>Variabelen opnieuw toewijzen</a:t>
+              <a:t>Variabel</a:t>
+            </a:r>
+            <a:r>
+              <a:rPr/>
+              <a:t> </a:t>
+            </a:r>
+            <a:r>
+              <a:rPr/>
+              <a:t>type</a:t>
+            </a:r>
+            <a:r>
+              <a:rPr/>
+              <a:t> </a:t>
+            </a:r>
+            <a:r>
+              <a:rPr/>
+              <a:t>bepalen</a:t>
+            </a:r>
+            <a:r>
+              <a:rPr/>
+              <a:t> </a:t>
+            </a:r>
+            <a:r>
+              <a:rPr/>
+              <a:t>met</a:t>
+            </a:r>
+            <a:r>
+              <a:rPr/>
+              <a:t> </a:t>
+            </a:r>
+            <a:r>
+              <a:rPr>
+                <a:latin typeface="Courier"/>
+              </a:rPr>
+              <a:t>type()</a:t>
             </a:r>
           </a:p>
         </p:txBody>
@@ -4090,12 +4486,108 @@
           <a:bodyPr/>
           <a:lstStyle/>
           <a:p>
-            <a:pPr lvl="0" indent="0" marL="0">
+            <a:pPr lvl="0" marL="0" indent="0">
               <a:buNone/>
             </a:pPr>
             <a:r>
               <a:rPr/>
-              <a:t>Met Python kun je variabelen opnieuw toewijzen met een verwijzing naar hetzelfde object.</a:t>
+              <a:t>U kunt controleren welk type object aan een variabele is toegewezen met behulp van de ingebouwde functie </a:t>
+            </a:r>
+            <a:r>
+              <a:rPr>
+                <a:latin typeface="Courier"/>
+              </a:rPr>
+              <a:t>type()</a:t>
+            </a:r>
+            <a:r>
+              <a:rPr/>
+              <a:t> van Python. Veel voorkomende gegevenstypen zijn: * </a:t>
+            </a:r>
+            <a:r>
+              <a:rPr b="1"/>
+              <a:t>int</a:t>
+            </a:r>
+            <a:r>
+              <a:rPr/>
+              <a:t> (voor integer) * </a:t>
+            </a:r>
+            <a:r>
+              <a:rPr b="1"/>
+              <a:t>float</a:t>
+            </a:r>
+            <a:r>
+              <a:rPr/>
+              <a:t> * </a:t>
+            </a:r>
+            <a:r>
+              <a:rPr b="1"/>
+              <a:t>str</a:t>
+            </a:r>
+            <a:r>
+              <a:rPr/>
+              <a:t> (voor string) * </a:t>
+            </a:r>
+            <a:r>
+              <a:rPr b="1"/>
+              <a:t>list</a:t>
+            </a:r>
+            <a:r>
+              <a:rPr/>
+              <a:t> * </a:t>
+            </a:r>
+            <a:r>
+              <a:rPr b="1"/>
+              <a:t>tuple</a:t>
+            </a:r>
+            <a:r>
+              <a:rPr/>
+              <a:t> * </a:t>
+            </a:r>
+            <a:r>
+              <a:rPr b="1"/>
+              <a:t>dict</a:t>
+            </a:r>
+            <a:r>
+              <a:rPr/>
+              <a:t> (voor dictionary) * </a:t>
+            </a:r>
+            <a:r>
+              <a:rPr b="1"/>
+              <a:t>set</a:t>
+            </a:r>
+            <a:r>
+              <a:rPr/>
+              <a:t> * </a:t>
+            </a:r>
+            <a:r>
+              <a:rPr b="1"/>
+              <a:t>bool</a:t>
+            </a:r>
+            <a:r>
+              <a:rPr/>
+              <a:t> (voor Boolean True/False)</a:t>
+            </a:r>
+          </a:p>
+          <a:p>
+            <a:pPr lvl="0" indent="0">
+              <a:buNone/>
+            </a:pPr>
+            <a:r>
+              <a:rPr>
+                <a:latin typeface="Courier"/>
+              </a:rPr>
+              <a:t>type(a)</a:t>
+            </a:r>
+          </a:p>
+          <a:p>
+            <a:pPr lvl="0" indent="0">
+              <a:buNone/>
+            </a:pPr>
+            <a:r>
+              <a:rPr>
+                <a:latin typeface="Courier"/>
+              </a:rPr>
+              <a:t>int</a:t>
             </a:r>
           </a:p>
           <a:p>
@@ -4121,22 +4613,7 @@
               <a:rPr>
                 <a:latin typeface="Courier"/>
               </a:rPr>
-              <a:t> a </a:t>
-            </a:r>
-            <a:r>
-              <a:rPr>
-                <a:solidFill>
-                  <a:srgbClr val="666666"/>
-                </a:solidFill>
-                <a:latin typeface="Courier"/>
-              </a:rPr>
-              <a:t>+</a:t>
-            </a:r>
-            <a:r>
-              <a:rPr>
-                <a:latin typeface="Courier"/>
-              </a:rPr>
-              <a:t> </a:t>
+              <a:t> (</a:t>
             </a:r>
             <a:r>
               <a:rPr>
@@ -4145,104 +4622,13 @@
                 </a:solidFill>
                 <a:latin typeface="Courier"/>
               </a:rPr>
-              <a:t>10</a:t>
-            </a:r>
-          </a:p>
-          <a:p>
-            <a:pPr lvl="0" indent="0">
-              <a:buNone/>
-            </a:pPr>
-            <a:r>
-              <a:rPr>
-                <a:latin typeface="Courier"/>
-              </a:rPr>
-              <a:t>a</a:t>
-            </a:r>
-          </a:p>
-          <a:p>
-            <a:pPr lvl="0" indent="0">
-              <a:buNone/>
-            </a:pPr>
-            <a:r>
-              <a:rPr>
-                <a:latin typeface="Courier"/>
-              </a:rPr>
-              <a:t>20</a:t>
-            </a:r>
-          </a:p>
-          <a:p>
-            <a:pPr lvl="0" indent="0" marL="0">
-              <a:buNone/>
-            </a:pPr>
-            <a:r>
-              <a:rPr/>
-              <a:t>Hier is een snelkoppeling voor. Met Python kun je getallen optellen, aftrekken, vermenigvuldigen en delen door ze opnieuw toe te wijzen met behulp van </a:t>
-            </a:r>
-            <a:r>
-              <a:rPr>
-                <a:latin typeface="Courier"/>
-              </a:rPr>
-              <a:t>+=</a:t>
-            </a:r>
-            <a:r>
-              <a:rPr/>
-              <a:t>, </a:t>
-            </a:r>
-            <a:r>
-              <a:rPr>
-                <a:latin typeface="Courier"/>
-              </a:rPr>
-              <a:t>-=</a:t>
-            </a:r>
-            <a:r>
-              <a:rPr/>
-              <a:t>, </a:t>
-            </a:r>
-            <a:r>
-              <a:rPr>
-                <a:latin typeface="Courier"/>
-              </a:rPr>
-              <a:t>*=</a:t>
-            </a:r>
-            <a:r>
-              <a:rPr/>
-              <a:t> en </a:t>
-            </a:r>
-            <a:r>
-              <a:rPr>
-                <a:latin typeface="Courier"/>
-              </a:rPr>
-              <a:t>/=</a:t>
-            </a:r>
-            <a:r>
-              <a:rPr/>
-              <a:t>.</a:t>
-            </a:r>
-          </a:p>
-          <a:p>
-            <a:pPr lvl="0" indent="0">
-              <a:buNone/>
-            </a:pPr>
-            <a:r>
-              <a:rPr>
-                <a:latin typeface="Courier"/>
-              </a:rPr>
-              <a:t>a </a:t>
-            </a:r>
-            <a:r>
-              <a:rPr>
-                <a:solidFill>
-                  <a:srgbClr val="666666"/>
-                </a:solidFill>
-                <a:latin typeface="Courier"/>
-              </a:rPr>
-              <a:t>+=</a:t>
-            </a:r>
-            <a:r>
-              <a:rPr>
-                <a:latin typeface="Courier"/>
-              </a:rPr>
-              <a:t> </a:t>
+              <a:t>1</a:t>
+            </a:r>
+            <a:r>
+              <a:rPr>
+                <a:latin typeface="Courier"/>
+              </a:rPr>
+              <a:t>,</a:t>
             </a:r>
             <a:r>
               <a:rPr>
@@ -4251,7 +4637,13 @@
                 </a:solidFill>
                 <a:latin typeface="Courier"/>
               </a:rPr>
-              <a:t>10</a:t>
+              <a:t>2</a:t>
+            </a:r>
+            <a:r>
+              <a:rPr>
+                <a:latin typeface="Courier"/>
+              </a:rPr>
+              <a:t>)</a:t>
             </a:r>
           </a:p>
           <a:p>
@@ -4262,7 +4654,7 @@
               <a:rPr>
                 <a:latin typeface="Courier"/>
               </a:rPr>
-              <a:t>a</a:t>
+              <a:t>type(a)</a:t>
             </a:r>
           </a:p>
           <a:p>
@@ -4273,64 +4665,7 @@
               <a:rPr>
                 <a:latin typeface="Courier"/>
               </a:rPr>
-              <a:t>30</a:t>
-            </a:r>
-          </a:p>
-          <a:p>
-            <a:pPr lvl="0" indent="0">
-              <a:buNone/>
-            </a:pPr>
-            <a:r>
-              <a:rPr>
-                <a:latin typeface="Courier"/>
-              </a:rPr>
-              <a:t>a </a:t>
-            </a:r>
-            <a:r>
-              <a:rPr>
-                <a:solidFill>
-                  <a:srgbClr val="666666"/>
-                </a:solidFill>
-                <a:latin typeface="Courier"/>
-              </a:rPr>
-              <a:t>*=</a:t>
-            </a:r>
-            <a:r>
-              <a:rPr>
-                <a:latin typeface="Courier"/>
-              </a:rPr>
-              <a:t> </a:t>
-            </a:r>
-            <a:r>
-              <a:rPr>
-                <a:solidFill>
-                  <a:srgbClr val="40A070"/>
-                </a:solidFill>
-                <a:latin typeface="Courier"/>
-              </a:rPr>
-              <a:t>2</a:t>
-            </a:r>
-          </a:p>
-          <a:p>
-            <a:pPr lvl="0" indent="0">
-              <a:buNone/>
-            </a:pPr>
-            <a:r>
-              <a:rPr>
-                <a:latin typeface="Courier"/>
-              </a:rPr>
-              <a:t>a</a:t>
-            </a:r>
-          </a:p>
-          <a:p>
-            <a:pPr lvl="0" indent="0">
-              <a:buNone/>
-            </a:pPr>
-            <a:r>
-              <a:rPr>
-                <a:latin typeface="Courier"/>
-              </a:rPr>
-              <a:t>60</a:t>
+              <a:t>tuple</a:t>
             </a:r>
           </a:p>
         </p:txBody>
@@ -4372,18 +4707,20 @@
           <a:bodyPr/>
           <a:lstStyle/>
           <a:p>
-            <a:pPr lvl="0" indent="0" marL="0">
+            <a:pPr lvl="0" marL="0" indent="0">
               <a:buNone/>
             </a:pPr>
             <a:r>
               <a:rPr/>
-              <a:t>Variabel type bepalen met </a:t>
-            </a:r>
-            <a:r>
-              <a:rPr>
-                <a:latin typeface="Courier"/>
-              </a:rPr>
-              <a:t>type()</a:t>
+              <a:t>Eenvoudige</a:t>
+            </a:r>
+            <a:r>
+              <a:rPr/>
+              <a:t> </a:t>
+            </a:r>
+            <a:r>
+              <a:rPr/>
+              <a:t>oefening</a:t>
             </a:r>
           </a:p>
         </p:txBody>
@@ -4403,94 +4740,12 @@
           <a:bodyPr/>
           <a:lstStyle/>
           <a:p>
-            <a:pPr lvl="0" indent="0" marL="0">
+            <a:pPr lvl="0" marL="0" indent="0">
               <a:buNone/>
             </a:pPr>
             <a:r>
               <a:rPr/>
-              <a:t>U kunt controleren welk type object aan een variabele is toegewezen met behulp van de ingebouwde functie </a:t>
-            </a:r>
-            <a:r>
-              <a:rPr>
-                <a:latin typeface="Courier"/>
-              </a:rPr>
-              <a:t>type()</a:t>
-            </a:r>
-            <a:r>
-              <a:rPr/>
-              <a:t> van Python. Veel voorkomende gegevenstypen zijn:</a:t>
-            </a:r>
-          </a:p>
-          <a:p>
-            <a:pPr lvl="0"/>
-            <a:r>
-              <a:rPr b="1"/>
-              <a:t>int</a:t>
-            </a:r>
-            <a:r>
-              <a:rPr/>
-              <a:t> (voor integer)</a:t>
-            </a:r>
-          </a:p>
-          <a:p>
-            <a:pPr lvl="0"/>
-            <a:r>
-              <a:rPr b="1"/>
-              <a:t>float</a:t>
-            </a:r>
-          </a:p>
-          <a:p>
-            <a:pPr lvl="0"/>
-            <a:r>
-              <a:rPr b="1"/>
-              <a:t>str</a:t>
-            </a:r>
-            <a:r>
-              <a:rPr/>
-              <a:t> (voor string)</a:t>
-            </a:r>
-          </a:p>
-          <a:p>
-            <a:pPr lvl="0"/>
-            <a:r>
-              <a:rPr b="1"/>
-              <a:t>list</a:t>
-            </a:r>
-          </a:p>
-          <a:p>
-            <a:pPr lvl="0"/>
-            <a:r>
-              <a:rPr b="1"/>
-              <a:t>tuple</a:t>
-            </a:r>
-          </a:p>
-          <a:p>
-            <a:pPr lvl="0"/>
-            <a:r>
-              <a:rPr b="1"/>
-              <a:t>dict</a:t>
-            </a:r>
-            <a:r>
-              <a:rPr/>
-              <a:t> (voor dictionary)</a:t>
-            </a:r>
-          </a:p>
-          <a:p>
-            <a:pPr lvl="0"/>
-            <a:r>
-              <a:rPr b="1"/>
-              <a:t>set</a:t>
-            </a:r>
-          </a:p>
-          <a:p>
-            <a:pPr lvl="0"/>
-            <a:r>
-              <a:rPr b="1"/>
-              <a:t>bool</a:t>
-            </a:r>
-            <a:r>
-              <a:rPr/>
-              <a:t> (voor Boolean True/False)</a:t>
+              <a:t>Dit laat zien hoe variabelen berekeningen leesbaarder en gemakkelijker te volgen maken.</a:t>
             </a:r>
           </a:p>
           <a:p>
@@ -4501,29 +4756,7 @@
               <a:rPr>
                 <a:latin typeface="Courier"/>
               </a:rPr>
-              <a:t>type(a)</a:t>
-            </a:r>
-          </a:p>
-          <a:p>
-            <a:pPr lvl="0" indent="0">
-              <a:buNone/>
-            </a:pPr>
-            <a:r>
-              <a:rPr>
-                <a:latin typeface="Courier"/>
-              </a:rPr>
-              <a:t>int</a:t>
-            </a:r>
-          </a:p>
-          <a:p>
-            <a:pPr lvl="0" indent="0">
-              <a:buNone/>
-            </a:pPr>
-            <a:r>
-              <a:rPr>
-                <a:latin typeface="Courier"/>
-              </a:rPr>
-              <a:t>a </a:t>
+              <a:t>my_income </a:t>
             </a:r>
             <a:r>
               <a:rPr>
@@ -4538,7 +4771,7 @@
               <a:rPr>
                 <a:latin typeface="Courier"/>
               </a:rPr>
-              <a:t> (</a:t>
+              <a:t> </a:t>
             </a:r>
             <a:r>
               <a:rPr>
@@ -4547,13 +4780,29 @@
                 </a:solidFill>
                 <a:latin typeface="Courier"/>
               </a:rPr>
-              <a:t>1</a:t>
-            </a:r>
-            <a:r>
-              <a:rPr>
-                <a:latin typeface="Courier"/>
-              </a:rPr>
-              <a:t>,</a:t>
+              <a:t>100</a:t>
+            </a:r>
+            <a:br/>
+            <a:r>
+              <a:rPr>
+                <a:latin typeface="Courier"/>
+              </a:rPr>
+              <a:t>tax_rate </a:t>
+            </a:r>
+            <a:r>
+              <a:rPr>
+                <a:solidFill>
+                  <a:srgbClr val="666666"/>
+                </a:solidFill>
+                <a:latin typeface="Courier"/>
+              </a:rPr>
+              <a:t>=</a:t>
+            </a:r>
+            <a:r>
+              <a:rPr>
+                <a:latin typeface="Courier"/>
+              </a:rPr>
+              <a:t> </a:t>
             </a:r>
             <a:r>
               <a:rPr>
@@ -4562,118 +4811,14 @@
                 </a:solidFill>
                 <a:latin typeface="Courier"/>
               </a:rPr>
-              <a:t>2</a:t>
-            </a:r>
-            <a:r>
-              <a:rPr>
-                <a:latin typeface="Courier"/>
-              </a:rPr>
-              <a:t>)</a:t>
-            </a:r>
-          </a:p>
-          <a:p>
-            <a:pPr lvl="0" indent="0">
-              <a:buNone/>
-            </a:pPr>
-            <a:r>
-              <a:rPr>
-                <a:latin typeface="Courier"/>
-              </a:rPr>
-              <a:t>type(a)</a:t>
-            </a:r>
-          </a:p>
-          <a:p>
-            <a:pPr lvl="0" indent="0">
-              <a:buNone/>
-            </a:pPr>
-            <a:r>
-              <a:rPr>
-                <a:latin typeface="Courier"/>
-              </a:rPr>
-              <a:t>tuple</a:t>
-            </a:r>
-          </a:p>
-        </p:txBody>
-      </p:sp>
-    </p:spTree>
-  </p:cSld>
-</p:sld>
-</file>
-
-<file path=ppt/slides/slide9.xml><?xml version="1.0" encoding="utf-8"?>
-<p:sld xmlns:a="http://schemas.openxmlformats.org/drawingml/2006/main" xmlns:r="http://schemas.openxmlformats.org/officeDocument/2006/relationships" xmlns:p="http://schemas.openxmlformats.org/presentationml/2006/main">
-  <p:cSld>
-    <p:spTree>
-      <p:nvGrpSpPr>
-        <p:cNvPr id="1" name=""/>
-        <p:cNvGrpSpPr/>
-        <p:nvPr/>
-      </p:nvGrpSpPr>
-      <p:grpSpPr>
-        <a:xfrm>
-          <a:off x="0" y="0"/>
-          <a:ext cx="0" cy="0"/>
-          <a:chOff x="0" y="0"/>
-          <a:chExt cx="0" cy="0"/>
-        </a:xfrm>
-      </p:grpSpPr>
-      <p:sp>
-        <p:nvSpPr>
-          <p:cNvPr id="2" name="Title 1"/>
-          <p:cNvSpPr>
-            <a:spLocks noGrp="1"/>
-          </p:cNvSpPr>
-          <p:nvPr>
-            <p:ph type="title"/>
-          </p:nvPr>
-        </p:nvSpPr>
-        <p:spPr/>
-        <p:txBody>
-          <a:bodyPr/>
-          <a:lstStyle/>
-          <a:p>
-            <a:pPr lvl="0" indent="0" marL="0">
-              <a:buNone/>
-            </a:pPr>
-            <a:r>
-              <a:rPr/>
-              <a:t>Eenvoudige oefening</a:t>
-            </a:r>
-          </a:p>
-        </p:txBody>
-      </p:sp>
-      <p:sp>
-        <p:nvSpPr>
-          <p:cNvPr id="3" name="Content Placeholder 2"/>
-          <p:cNvSpPr>
-            <a:spLocks noGrp="1"/>
-          </p:cNvSpPr>
-          <p:nvPr>
-            <p:ph idx="1"/>
-          </p:nvPr>
-        </p:nvSpPr>
-        <p:spPr/>
-        <p:txBody>
-          <a:bodyPr/>
-          <a:lstStyle/>
-          <a:p>
-            <a:pPr lvl="0" indent="0" marL="0">
-              <a:buNone/>
-            </a:pPr>
-            <a:r>
-              <a:rPr/>
-              <a:t>Dit laat zien hoe variabelen berekeningen leesbaarder en gemakkelijker te volgen maken.</a:t>
-            </a:r>
-          </a:p>
-          <a:p>
-            <a:pPr lvl="0" indent="0">
-              <a:buNone/>
-            </a:pPr>
-            <a:r>
-              <a:rPr>
-                <a:latin typeface="Courier"/>
-              </a:rPr>
-              <a:t>my_income </a:t>
+              <a:t>0.1</a:t>
+            </a:r>
+            <a:br/>
+            <a:r>
+              <a:rPr>
+                <a:latin typeface="Courier"/>
+              </a:rPr>
+              <a:t>my_taxes </a:t>
             </a:r>
             <a:r>
               <a:rPr>
@@ -4688,23 +4833,7 @@
               <a:rPr>
                 <a:latin typeface="Courier"/>
               </a:rPr>
-              <a:t> </a:t>
-            </a:r>
-            <a:r>
-              <a:rPr>
-                <a:solidFill>
-                  <a:srgbClr val="40A070"/>
-                </a:solidFill>
-                <a:latin typeface="Courier"/>
-              </a:rPr>
-              <a:t>100</a:t>
-            </a:r>
-            <a:br/>
-            <a:r>
-              <a:rPr>
-                <a:latin typeface="Courier"/>
-              </a:rPr>
-              <a:t>tax_rate </a:t>
+              <a:t> my_income </a:t>
             </a:r>
             <a:r>
               <a:rPr>
@@ -4713,52 +4842,6 @@
                 </a:solidFill>
                 <a:latin typeface="Courier"/>
               </a:rPr>
-              <a:t>=</a:t>
-            </a:r>
-            <a:r>
-              <a:rPr>
-                <a:latin typeface="Courier"/>
-              </a:rPr>
-              <a:t> </a:t>
-            </a:r>
-            <a:r>
-              <a:rPr>
-                <a:solidFill>
-                  <a:srgbClr val="40A070"/>
-                </a:solidFill>
-                <a:latin typeface="Courier"/>
-              </a:rPr>
-              <a:t>0.1</a:t>
-            </a:r>
-            <a:br/>
-            <a:r>
-              <a:rPr>
-                <a:latin typeface="Courier"/>
-              </a:rPr>
-              <a:t>my_taxes </a:t>
-            </a:r>
-            <a:r>
-              <a:rPr>
-                <a:solidFill>
-                  <a:srgbClr val="666666"/>
-                </a:solidFill>
-                <a:latin typeface="Courier"/>
-              </a:rPr>
-              <a:t>=</a:t>
-            </a:r>
-            <a:r>
-              <a:rPr>
-                <a:latin typeface="Courier"/>
-              </a:rPr>
-              <a:t> my_income </a:t>
-            </a:r>
-            <a:r>
-              <a:rPr>
-                <a:solidFill>
-                  <a:srgbClr val="666666"/>
-                </a:solidFill>
-                <a:latin typeface="Courier"/>
-              </a:rPr>
               <a:t>*</a:t>
             </a:r>
             <a:r>
@@ -4791,7 +4874,7 @@
             </a:r>
           </a:p>
           <a:p>
-            <a:pPr lvl="0" indent="0" marL="0">
+            <a:pPr lvl="0" marL="0" indent="0">
               <a:buNone/>
             </a:pPr>
             <a:r>
@@ -5124,265 +5207,4 @@
   </a:objectDefaults>
   <a:extraClrSchemeLst/>
 </a:theme>
-</file>
-
-<file path=ppt/theme/theme2.xml><?xml version="1.0" encoding="utf-8"?>
-<a:theme xmlns:a="http://schemas.openxmlformats.org/drawingml/2006/main" name="Office Theme">
-  <a:themeElements>
-    <a:clrScheme name="Office">
-      <a:dk1>
-        <a:sysClr val="windowText" lastClr="000000"/>
-      </a:dk1>
-      <a:lt1>
-        <a:sysClr val="window" lastClr="FFFFFF"/>
-      </a:lt1>
-      <a:dk2>
-        <a:srgbClr val="44546A"/>
-      </a:dk2>
-      <a:lt2>
-        <a:srgbClr val="E7E6E6"/>
-      </a:lt2>
-      <a:accent1>
-        <a:srgbClr val="5B9BD5"/>
-      </a:accent1>
-      <a:accent2>
-        <a:srgbClr val="ED7D31"/>
-      </a:accent2>
-      <a:accent3>
-        <a:srgbClr val="A5A5A5"/>
-      </a:accent3>
-      <a:accent4>
-        <a:srgbClr val="FFC000"/>
-      </a:accent4>
-      <a:accent5>
-        <a:srgbClr val="4472C4"/>
-      </a:accent5>
-      <a:accent6>
-        <a:srgbClr val="70AD47"/>
-      </a:accent6>
-      <a:hlink>
-        <a:srgbClr val="0563C1"/>
-      </a:hlink>
-      <a:folHlink>
-        <a:srgbClr val="954F72"/>
-      </a:folHlink>
-    </a:clrScheme>
-    <a:fontScheme name="Office">
-      <a:majorFont>
-        <a:latin typeface="Calibri Light" panose="020F0302020204030204"/>
-        <a:ea typeface=""/>
-        <a:cs typeface=""/>
-        <a:font script="Jpan" typeface="ＭＳ Ｐゴシック"/>
-        <a:font script="Hang" typeface="맑은 고딕"/>
-        <a:font script="Hans" typeface="宋体"/>
-        <a:font script="Hant" typeface="新細明體"/>
-        <a:font script="Arab" typeface="Times New Roman"/>
-        <a:font script="Hebr" typeface="Times New Roman"/>
-        <a:font script="Thai" typeface="Angsana New"/>
-        <a:font script="Ethi" typeface="Nyala"/>
-        <a:font script="Beng" typeface="Vrinda"/>
-        <a:font script="Gujr" typeface="Shruti"/>
-        <a:font script="Khmr" typeface="MoolBoran"/>
-        <a:font script="Knda" typeface="Tunga"/>
-        <a:font script="Guru" typeface="Raavi"/>
-        <a:font script="Cans" typeface="Euphemia"/>
-        <a:font script="Cher" typeface="Plantagenet Cherokee"/>
-        <a:font script="Yiii" typeface="Microsoft Yi Baiti"/>
-        <a:font script="Tibt" typeface="Microsoft Himalaya"/>
-        <a:font script="Thaa" typeface="MV Boli"/>
-        <a:font script="Deva" typeface="Mangal"/>
-        <a:font script="Telu" typeface="Gautami"/>
-        <a:font script="Taml" typeface="Latha"/>
-        <a:font script="Syrc" typeface="Estrangelo Edessa"/>
-        <a:font script="Orya" typeface="Kalinga"/>
-        <a:font script="Mlym" typeface="Kartika"/>
-        <a:font script="Laoo" typeface="DokChampa"/>
-        <a:font script="Sinh" typeface="Iskoola Pota"/>
-        <a:font script="Mong" typeface="Mongolian Baiti"/>
-        <a:font script="Viet" typeface="Times New Roman"/>
-        <a:font script="Uigh" typeface="Microsoft Uighur"/>
-        <a:font script="Geor" typeface="Sylfaen"/>
-      </a:majorFont>
-      <a:minorFont>
-        <a:latin typeface="Calibri" panose="020F0502020204030204"/>
-        <a:ea typeface=""/>
-        <a:cs typeface=""/>
-        <a:font script="Jpan" typeface="ＭＳ Ｐゴシック"/>
-        <a:font script="Hang" typeface="맑은 고딕"/>
-        <a:font script="Hans" typeface="宋体"/>
-        <a:font script="Hant" typeface="新細明體"/>
-        <a:font script="Arab" typeface="Arial"/>
-        <a:font script="Hebr" typeface="Arial"/>
-        <a:font script="Thai" typeface="Cordia New"/>
-        <a:font script="Ethi" typeface="Nyala"/>
-        <a:font script="Beng" typeface="Vrinda"/>
-        <a:font script="Gujr" typeface="Shruti"/>
-        <a:font script="Khmr" typeface="DaunPenh"/>
-        <a:font script="Knda" typeface="Tunga"/>
-        <a:font script="Guru" typeface="Raavi"/>
-        <a:font script="Cans" typeface="Euphemia"/>
-        <a:font script="Cher" typeface="Plantagenet Cherokee"/>
-        <a:font script="Yiii" typeface="Microsoft Yi Baiti"/>
-        <a:font script="Tibt" typeface="Microsoft Himalaya"/>
-        <a:font script="Thaa" typeface="MV Boli"/>
-        <a:font script="Deva" typeface="Mangal"/>
-        <a:font script="Telu" typeface="Gautami"/>
-        <a:font script="Taml" typeface="Latha"/>
-        <a:font script="Syrc" typeface="Estrangelo Edessa"/>
-        <a:font script="Orya" typeface="Kalinga"/>
-        <a:font script="Mlym" typeface="Kartika"/>
-        <a:font script="Laoo" typeface="DokChampa"/>
-        <a:font script="Sinh" typeface="Iskoola Pota"/>
-        <a:font script="Mong" typeface="Mongolian Baiti"/>
-        <a:font script="Viet" typeface="Arial"/>
-        <a:font script="Uigh" typeface="Microsoft Uighur"/>
-        <a:font script="Geor" typeface="Sylfaen"/>
-      </a:minorFont>
-    </a:fontScheme>
-    <a:fmtScheme name="Office">
-      <a:fillStyleLst>
-        <a:solidFill>
-          <a:schemeClr val="phClr"/>
-        </a:solidFill>
-        <a:gradFill rotWithShape="1">
-          <a:gsLst>
-            <a:gs pos="0">
-              <a:schemeClr val="phClr">
-                <a:lumMod val="110000"/>
-                <a:satMod val="105000"/>
-                <a:tint val="67000"/>
-              </a:schemeClr>
-            </a:gs>
-            <a:gs pos="50000">
-              <a:schemeClr val="phClr">
-                <a:lumMod val="105000"/>
-                <a:satMod val="103000"/>
-                <a:tint val="73000"/>
-              </a:schemeClr>
-            </a:gs>
-            <a:gs pos="100000">
-              <a:schemeClr val="phClr">
-                <a:lumMod val="105000"/>
-                <a:satMod val="109000"/>
-                <a:tint val="81000"/>
-              </a:schemeClr>
-            </a:gs>
-          </a:gsLst>
-          <a:lin ang="5400000" scaled="0"/>
-        </a:gradFill>
-        <a:gradFill rotWithShape="1">
-          <a:gsLst>
-            <a:gs pos="0">
-              <a:schemeClr val="phClr">
-                <a:satMod val="103000"/>
-                <a:lumMod val="102000"/>
-                <a:tint val="94000"/>
-              </a:schemeClr>
-            </a:gs>
-            <a:gs pos="50000">
-              <a:schemeClr val="phClr">
-                <a:satMod val="110000"/>
-                <a:lumMod val="100000"/>
-                <a:shade val="100000"/>
-              </a:schemeClr>
-            </a:gs>
-            <a:gs pos="100000">
-              <a:schemeClr val="phClr">
-                <a:lumMod val="99000"/>
-                <a:satMod val="120000"/>
-                <a:shade val="78000"/>
-              </a:schemeClr>
-            </a:gs>
-          </a:gsLst>
-          <a:lin ang="5400000" scaled="0"/>
-        </a:gradFill>
-      </a:fillStyleLst>
-      <a:lnStyleLst>
-        <a:ln w="6350" cap="flat" cmpd="sng" algn="ctr">
-          <a:solidFill>
-            <a:schemeClr val="phClr"/>
-          </a:solidFill>
-          <a:prstDash val="solid"/>
-          <a:miter lim="800000"/>
-        </a:ln>
-        <a:ln w="12700" cap="flat" cmpd="sng" algn="ctr">
-          <a:solidFill>
-            <a:schemeClr val="phClr"/>
-          </a:solidFill>
-          <a:prstDash val="solid"/>
-          <a:miter lim="800000"/>
-        </a:ln>
-        <a:ln w="19050" cap="flat" cmpd="sng" algn="ctr">
-          <a:solidFill>
-            <a:schemeClr val="phClr"/>
-          </a:solidFill>
-          <a:prstDash val="solid"/>
-          <a:miter lim="800000"/>
-        </a:ln>
-      </a:lnStyleLst>
-      <a:effectStyleLst>
-        <a:effectStyle>
-          <a:effectLst/>
-        </a:effectStyle>
-        <a:effectStyle>
-          <a:effectLst/>
-        </a:effectStyle>
-        <a:effectStyle>
-          <a:effectLst>
-            <a:outerShdw blurRad="57150" dist="19050" dir="5400000" algn="ctr" rotWithShape="0">
-              <a:srgbClr val="000000">
-                <a:alpha val="63000"/>
-              </a:srgbClr>
-            </a:outerShdw>
-          </a:effectLst>
-        </a:effectStyle>
-      </a:effectStyleLst>
-      <a:bgFillStyleLst>
-        <a:solidFill>
-          <a:schemeClr val="phClr"/>
-        </a:solidFill>
-        <a:solidFill>
-          <a:schemeClr val="phClr">
-            <a:tint val="95000"/>
-            <a:satMod val="170000"/>
-          </a:schemeClr>
-        </a:solidFill>
-        <a:gradFill rotWithShape="1">
-          <a:gsLst>
-            <a:gs pos="0">
-              <a:schemeClr val="phClr">
-                <a:tint val="93000"/>
-                <a:satMod val="150000"/>
-                <a:shade val="98000"/>
-                <a:lumMod val="102000"/>
-              </a:schemeClr>
-            </a:gs>
-            <a:gs pos="50000">
-              <a:schemeClr val="phClr">
-                <a:tint val="98000"/>
-                <a:satMod val="130000"/>
-                <a:shade val="90000"/>
-                <a:lumMod val="103000"/>
-              </a:schemeClr>
-            </a:gs>
-            <a:gs pos="100000">
-              <a:schemeClr val="phClr">
-                <a:shade val="63000"/>
-                <a:satMod val="120000"/>
-              </a:schemeClr>
-            </a:gs>
-          </a:gsLst>
-          <a:lin ang="5400000" scaled="0"/>
-        </a:gradFill>
-      </a:bgFillStyleLst>
-    </a:fmtScheme>
-  </a:themeElements>
-  <a:objectDefaults/>
-  <a:extraClrSchemeLst/>
-  <a:extLst>
-    <a:ext uri="{05A4C25C-085E-4340-85A3-A5531E510DB2}">
-      <thm15:themeFamily xmlns:thm15="http://schemas.microsoft.com/office/thememl/2012/main" name="Office Theme" id="{62F939B6-93AF-4DB8-9C6B-D6C7DFDC589F}" vid="{4A3C46E8-61CC-4603-A589-7422A47A8E4A}"/>
-    </a:ext>
-  </a:extLst>
-</a:theme>
 </file>
</xml_diff>